<commit_message>
updating slides with more info on lambda
</commit_message>
<xml_diff>
--- a/ClassMaterials/Lambda/Lambda.pptx
+++ b/ClassMaterials/Lambda/Lambda.pptx
@@ -5,10 +5,10 @@
     <p:sldMasterId id="2147483685" r:id="rId1"/>
   </p:sldMasterIdLst>
   <p:notesMasterIdLst>
-    <p:notesMasterId r:id="rId11"/>
+    <p:notesMasterId r:id="rId12"/>
   </p:notesMasterIdLst>
   <p:handoutMasterIdLst>
-    <p:handoutMasterId r:id="rId12"/>
+    <p:handoutMasterId r:id="rId13"/>
   </p:handoutMasterIdLst>
   <p:sldIdLst>
     <p:sldId id="256" r:id="rId2"/>
@@ -17,9 +17,10 @@
     <p:sldId id="292" r:id="rId5"/>
     <p:sldId id="297" r:id="rId6"/>
     <p:sldId id="299" r:id="rId7"/>
-    <p:sldId id="277" r:id="rId8"/>
-    <p:sldId id="296" r:id="rId9"/>
-    <p:sldId id="294" r:id="rId10"/>
+    <p:sldId id="296" r:id="rId8"/>
+    <p:sldId id="301" r:id="rId9"/>
+    <p:sldId id="302" r:id="rId10"/>
+    <p:sldId id="294" r:id="rId11"/>
   </p:sldIdLst>
   <p:sldSz cx="12192000" cy="6858000"/>
   <p:notesSz cx="7315200" cy="9601200"/>
@@ -167,6 +168,284 @@
 </p:presentation>
 </file>
 
+<file path=ppt/revisionInfo.xml><?xml version="1.0" encoding="utf-8"?>
+<p1510:revInfo xmlns:a="http://schemas.openxmlformats.org/drawingml/2006/main" xmlns:r="http://schemas.openxmlformats.org/officeDocument/2006/relationships" xmlns:p1510="http://schemas.microsoft.com/office/powerpoint/2015/10/main">
+  <p1510:revLst>
+    <p1510:client id="{F6AE6E5C-FBA6-43D7-86C4-673D21C81915}" v="92" dt="2021-09-03T14:04:19.143"/>
+  </p1510:revLst>
+</p1510:revInfo>
+</file>
+
+<file path=ppt/changesInfos/changesInfo1.xml><?xml version="1.0" encoding="utf-8"?>
+<pc:chgInfo xmlns:a="http://schemas.openxmlformats.org/drawingml/2006/main" xmlns:r="http://schemas.openxmlformats.org/officeDocument/2006/relationships" xmlns:ac="http://schemas.microsoft.com/office/drawing/2013/main/command" xmlns:pc="http://schemas.microsoft.com/office/powerpoint/2013/main/command">
+  <pc:docChgLst>
+    <pc:chgData name="Hewner, Mike" userId="7f3f83dd-6dfb-4127-a87f-c1714bd4fac9" providerId="ADAL" clId="{F6AE6E5C-FBA6-43D7-86C4-673D21C81915}"/>
+    <pc:docChg chg="undo custSel addSld delSld modSld">
+      <pc:chgData name="Hewner, Mike" userId="7f3f83dd-6dfb-4127-a87f-c1714bd4fac9" providerId="ADAL" clId="{F6AE6E5C-FBA6-43D7-86C4-673D21C81915}" dt="2021-09-03T14:05:26.337" v="1400" actId="1076"/>
+      <pc:docMkLst>
+        <pc:docMk/>
+      </pc:docMkLst>
+      <pc:sldChg chg="delSp modSp mod">
+        <pc:chgData name="Hewner, Mike" userId="7f3f83dd-6dfb-4127-a87f-c1714bd4fac9" providerId="ADAL" clId="{F6AE6E5C-FBA6-43D7-86C4-673D21C81915}" dt="2021-09-03T13:25:45.116" v="216" actId="20577"/>
+        <pc:sldMkLst>
+          <pc:docMk/>
+          <pc:sldMk cId="0" sldId="256"/>
+        </pc:sldMkLst>
+        <pc:spChg chg="del mod">
+          <ac:chgData name="Hewner, Mike" userId="7f3f83dd-6dfb-4127-a87f-c1714bd4fac9" providerId="ADAL" clId="{F6AE6E5C-FBA6-43D7-86C4-673D21C81915}" dt="2021-09-03T13:25:35.477" v="192" actId="478"/>
+          <ac:spMkLst>
+            <pc:docMk/>
+            <pc:sldMk cId="0" sldId="256"/>
+            <ac:spMk id="3076" creationId="{00000000-0000-0000-0000-000000000000}"/>
+          </ac:spMkLst>
+        </pc:spChg>
+        <pc:spChg chg="mod">
+          <ac:chgData name="Hewner, Mike" userId="7f3f83dd-6dfb-4127-a87f-c1714bd4fac9" providerId="ADAL" clId="{F6AE6E5C-FBA6-43D7-86C4-673D21C81915}" dt="2021-09-03T13:25:45.116" v="216" actId="20577"/>
+          <ac:spMkLst>
+            <pc:docMk/>
+            <pc:sldMk cId="0" sldId="256"/>
+            <ac:spMk id="273411" creationId="{00000000-0000-0000-0000-000000000000}"/>
+          </ac:spMkLst>
+        </pc:spChg>
+      </pc:sldChg>
+      <pc:sldChg chg="del">
+        <pc:chgData name="Hewner, Mike" userId="7f3f83dd-6dfb-4127-a87f-c1714bd4fac9" providerId="ADAL" clId="{F6AE6E5C-FBA6-43D7-86C4-673D21C81915}" dt="2021-09-03T13:35:31.654" v="406" actId="47"/>
+        <pc:sldMkLst>
+          <pc:docMk/>
+          <pc:sldMk cId="0" sldId="277"/>
+        </pc:sldMkLst>
+      </pc:sldChg>
+      <pc:sldChg chg="modSp">
+        <pc:chgData name="Hewner, Mike" userId="7f3f83dd-6dfb-4127-a87f-c1714bd4fac9" providerId="ADAL" clId="{F6AE6E5C-FBA6-43D7-86C4-673D21C81915}" dt="2021-09-03T13:36:25.116" v="475" actId="20577"/>
+        <pc:sldMkLst>
+          <pc:docMk/>
+          <pc:sldMk cId="2897424243" sldId="294"/>
+        </pc:sldMkLst>
+        <pc:spChg chg="mod">
+          <ac:chgData name="Hewner, Mike" userId="7f3f83dd-6dfb-4127-a87f-c1714bd4fac9" providerId="ADAL" clId="{F6AE6E5C-FBA6-43D7-86C4-673D21C81915}" dt="2021-09-03T13:36:25.116" v="475" actId="20577"/>
+          <ac:spMkLst>
+            <pc:docMk/>
+            <pc:sldMk cId="2897424243" sldId="294"/>
+            <ac:spMk id="318467" creationId="{00000000-0000-0000-0000-000000000000}"/>
+          </ac:spMkLst>
+        </pc:spChg>
+      </pc:sldChg>
+      <pc:sldChg chg="modSp mod">
+        <pc:chgData name="Hewner, Mike" userId="7f3f83dd-6dfb-4127-a87f-c1714bd4fac9" providerId="ADAL" clId="{F6AE6E5C-FBA6-43D7-86C4-673D21C81915}" dt="2021-09-03T13:42:57.463" v="663" actId="20577"/>
+        <pc:sldMkLst>
+          <pc:docMk/>
+          <pc:sldMk cId="1424549170" sldId="296"/>
+        </pc:sldMkLst>
+        <pc:spChg chg="mod">
+          <ac:chgData name="Hewner, Mike" userId="7f3f83dd-6dfb-4127-a87f-c1714bd4fac9" providerId="ADAL" clId="{F6AE6E5C-FBA6-43D7-86C4-673D21C81915}" dt="2021-09-03T13:42:57.463" v="663" actId="20577"/>
+          <ac:spMkLst>
+            <pc:docMk/>
+            <pc:sldMk cId="1424549170" sldId="296"/>
+            <ac:spMk id="304130" creationId="{00000000-0000-0000-0000-000000000000}"/>
+          </ac:spMkLst>
+        </pc:spChg>
+      </pc:sldChg>
+      <pc:sldChg chg="modSp mod">
+        <pc:chgData name="Hewner, Mike" userId="7f3f83dd-6dfb-4127-a87f-c1714bd4fac9" providerId="ADAL" clId="{F6AE6E5C-FBA6-43D7-86C4-673D21C81915}" dt="2021-09-03T13:35:23.418" v="405" actId="20577"/>
+        <pc:sldMkLst>
+          <pc:docMk/>
+          <pc:sldMk cId="136193430" sldId="297"/>
+        </pc:sldMkLst>
+        <pc:spChg chg="mod">
+          <ac:chgData name="Hewner, Mike" userId="7f3f83dd-6dfb-4127-a87f-c1714bd4fac9" providerId="ADAL" clId="{F6AE6E5C-FBA6-43D7-86C4-673D21C81915}" dt="2021-09-03T13:35:23.418" v="405" actId="20577"/>
+          <ac:spMkLst>
+            <pc:docMk/>
+            <pc:sldMk cId="136193430" sldId="297"/>
+            <ac:spMk id="92163" creationId="{00000000-0000-0000-0000-000000000000}"/>
+          </ac:spMkLst>
+        </pc:spChg>
+      </pc:sldChg>
+      <pc:sldChg chg="modSp mod">
+        <pc:chgData name="Hewner, Mike" userId="7f3f83dd-6dfb-4127-a87f-c1714bd4fac9" providerId="ADAL" clId="{F6AE6E5C-FBA6-43D7-86C4-673D21C81915}" dt="2021-09-03T13:34:55.914" v="385" actId="5793"/>
+        <pc:sldMkLst>
+          <pc:docMk/>
+          <pc:sldMk cId="2879101978" sldId="300"/>
+        </pc:sldMkLst>
+        <pc:spChg chg="mod">
+          <ac:chgData name="Hewner, Mike" userId="7f3f83dd-6dfb-4127-a87f-c1714bd4fac9" providerId="ADAL" clId="{F6AE6E5C-FBA6-43D7-86C4-673D21C81915}" dt="2021-09-03T13:34:55.914" v="385" actId="5793"/>
+          <ac:spMkLst>
+            <pc:docMk/>
+            <pc:sldMk cId="2879101978" sldId="300"/>
+            <ac:spMk id="3" creationId="{20358E11-049B-40D2-82DB-949F2568C944}"/>
+          </ac:spMkLst>
+        </pc:spChg>
+      </pc:sldChg>
+      <pc:sldChg chg="addSp delSp modSp new mod">
+        <pc:chgData name="Hewner, Mike" userId="7f3f83dd-6dfb-4127-a87f-c1714bd4fac9" providerId="ADAL" clId="{F6AE6E5C-FBA6-43D7-86C4-673D21C81915}" dt="2021-09-03T14:05:14.823" v="1399" actId="313"/>
+        <pc:sldMkLst>
+          <pc:docMk/>
+          <pc:sldMk cId="2247978926" sldId="301"/>
+        </pc:sldMkLst>
+        <pc:spChg chg="mod">
+          <ac:chgData name="Hewner, Mike" userId="7f3f83dd-6dfb-4127-a87f-c1714bd4fac9" providerId="ADAL" clId="{F6AE6E5C-FBA6-43D7-86C4-673D21C81915}" dt="2021-09-03T14:05:14.823" v="1399" actId="313"/>
+          <ac:spMkLst>
+            <pc:docMk/>
+            <pc:sldMk cId="2247978926" sldId="301"/>
+            <ac:spMk id="2" creationId="{C7079EC8-E960-47A9-8A9E-7B9B7A53907E}"/>
+          </ac:spMkLst>
+        </pc:spChg>
+        <pc:spChg chg="del">
+          <ac:chgData name="Hewner, Mike" userId="7f3f83dd-6dfb-4127-a87f-c1714bd4fac9" providerId="ADAL" clId="{F6AE6E5C-FBA6-43D7-86C4-673D21C81915}" dt="2021-09-03T13:37:12.028" v="498" actId="478"/>
+          <ac:spMkLst>
+            <pc:docMk/>
+            <pc:sldMk cId="2247978926" sldId="301"/>
+            <ac:spMk id="3" creationId="{D2FBD7C2-056B-4050-96C2-2D2CFD918BBD}"/>
+          </ac:spMkLst>
+        </pc:spChg>
+        <pc:spChg chg="add mod">
+          <ac:chgData name="Hewner, Mike" userId="7f3f83dd-6dfb-4127-a87f-c1714bd4fac9" providerId="ADAL" clId="{F6AE6E5C-FBA6-43D7-86C4-673D21C81915}" dt="2021-09-03T13:37:49.832" v="504" actId="1076"/>
+          <ac:spMkLst>
+            <pc:docMk/>
+            <pc:sldMk cId="2247978926" sldId="301"/>
+            <ac:spMk id="5" creationId="{FE63B46B-ED12-42A9-9118-351D26FA88D5}"/>
+          </ac:spMkLst>
+        </pc:spChg>
+        <pc:spChg chg="add del mod">
+          <ac:chgData name="Hewner, Mike" userId="7f3f83dd-6dfb-4127-a87f-c1714bd4fac9" providerId="ADAL" clId="{F6AE6E5C-FBA6-43D7-86C4-673D21C81915}" dt="2021-09-03T13:39:05.287" v="527" actId="478"/>
+          <ac:spMkLst>
+            <pc:docMk/>
+            <pc:sldMk cId="2247978926" sldId="301"/>
+            <ac:spMk id="6" creationId="{B6988A31-D815-488A-89D2-B88115111A00}"/>
+          </ac:spMkLst>
+        </pc:spChg>
+        <pc:spChg chg="add mod">
+          <ac:chgData name="Hewner, Mike" userId="7f3f83dd-6dfb-4127-a87f-c1714bd4fac9" providerId="ADAL" clId="{F6AE6E5C-FBA6-43D7-86C4-673D21C81915}" dt="2021-09-03T13:39:33.959" v="541" actId="14100"/>
+          <ac:spMkLst>
+            <pc:docMk/>
+            <pc:sldMk cId="2247978926" sldId="301"/>
+            <ac:spMk id="7" creationId="{E724C28E-ECC0-40A5-98D7-126F7E5889EA}"/>
+          </ac:spMkLst>
+        </pc:spChg>
+        <pc:spChg chg="add mod">
+          <ac:chgData name="Hewner, Mike" userId="7f3f83dd-6dfb-4127-a87f-c1714bd4fac9" providerId="ADAL" clId="{F6AE6E5C-FBA6-43D7-86C4-673D21C81915}" dt="2021-09-03T13:40:41.791" v="621" actId="20577"/>
+          <ac:spMkLst>
+            <pc:docMk/>
+            <pc:sldMk cId="2247978926" sldId="301"/>
+            <ac:spMk id="8" creationId="{50B0AD70-17B2-449D-8796-AC39B8E330B0}"/>
+          </ac:spMkLst>
+        </pc:spChg>
+        <pc:spChg chg="add mod">
+          <ac:chgData name="Hewner, Mike" userId="7f3f83dd-6dfb-4127-a87f-c1714bd4fac9" providerId="ADAL" clId="{F6AE6E5C-FBA6-43D7-86C4-673D21C81915}" dt="2021-09-03T13:41:19.094" v="652" actId="14100"/>
+          <ac:spMkLst>
+            <pc:docMk/>
+            <pc:sldMk cId="2247978926" sldId="301"/>
+            <ac:spMk id="9" creationId="{7C4E8E51-AD42-4FA1-8002-136134808BF7}"/>
+          </ac:spMkLst>
+        </pc:spChg>
+        <pc:spChg chg="add del mod">
+          <ac:chgData name="Hewner, Mike" userId="7f3f83dd-6dfb-4127-a87f-c1714bd4fac9" providerId="ADAL" clId="{F6AE6E5C-FBA6-43D7-86C4-673D21C81915}" dt="2021-09-03T14:03:41.338" v="1330" actId="478"/>
+          <ac:spMkLst>
+            <pc:docMk/>
+            <pc:sldMk cId="2247978926" sldId="301"/>
+            <ac:spMk id="10" creationId="{559DC29A-BF45-4375-A634-947D85D3004D}"/>
+          </ac:spMkLst>
+        </pc:spChg>
+        <pc:spChg chg="add mod">
+          <ac:chgData name="Hewner, Mike" userId="7f3f83dd-6dfb-4127-a87f-c1714bd4fac9" providerId="ADAL" clId="{F6AE6E5C-FBA6-43D7-86C4-673D21C81915}" dt="2021-09-03T14:03:57.934" v="1342" actId="1076"/>
+          <ac:spMkLst>
+            <pc:docMk/>
+            <pc:sldMk cId="2247978926" sldId="301"/>
+            <ac:spMk id="11" creationId="{0D5D01B4-178A-4826-8F01-D13D8F0A1DFA}"/>
+          </ac:spMkLst>
+        </pc:spChg>
+        <pc:spChg chg="add del mod">
+          <ac:chgData name="Hewner, Mike" userId="7f3f83dd-6dfb-4127-a87f-c1714bd4fac9" providerId="ADAL" clId="{F6AE6E5C-FBA6-43D7-86C4-673D21C81915}" dt="2021-09-03T14:03:41.338" v="1330" actId="478"/>
+          <ac:spMkLst>
+            <pc:docMk/>
+            <pc:sldMk cId="2247978926" sldId="301"/>
+            <ac:spMk id="12" creationId="{08C80557-C5F5-4650-8571-4A3EAFB86A17}"/>
+          </ac:spMkLst>
+        </pc:spChg>
+        <pc:spChg chg="add mod">
+          <ac:chgData name="Hewner, Mike" userId="7f3f83dd-6dfb-4127-a87f-c1714bd4fac9" providerId="ADAL" clId="{F6AE6E5C-FBA6-43D7-86C4-673D21C81915}" dt="2021-09-03T14:04:50.068" v="1395" actId="114"/>
+          <ac:spMkLst>
+            <pc:docMk/>
+            <pc:sldMk cId="2247978926" sldId="301"/>
+            <ac:spMk id="13" creationId="{D9406FEA-93E4-49DC-870D-845C4B87ACA3}"/>
+          </ac:spMkLst>
+        </pc:spChg>
+      </pc:sldChg>
+      <pc:sldChg chg="addSp delSp modSp new mod">
+        <pc:chgData name="Hewner, Mike" userId="7f3f83dd-6dfb-4127-a87f-c1714bd4fac9" providerId="ADAL" clId="{F6AE6E5C-FBA6-43D7-86C4-673D21C81915}" dt="2021-09-03T14:05:26.337" v="1400" actId="1076"/>
+        <pc:sldMkLst>
+          <pc:docMk/>
+          <pc:sldMk cId="899949444" sldId="302"/>
+        </pc:sldMkLst>
+        <pc:spChg chg="mod">
+          <ac:chgData name="Hewner, Mike" userId="7f3f83dd-6dfb-4127-a87f-c1714bd4fac9" providerId="ADAL" clId="{F6AE6E5C-FBA6-43D7-86C4-673D21C81915}" dt="2021-09-03T13:59:56.742" v="1170" actId="14100"/>
+          <ac:spMkLst>
+            <pc:docMk/>
+            <pc:sldMk cId="899949444" sldId="302"/>
+            <ac:spMk id="2" creationId="{7385845F-3F63-4370-B1DE-632D2EB54A49}"/>
+          </ac:spMkLst>
+        </pc:spChg>
+        <pc:spChg chg="del">
+          <ac:chgData name="Hewner, Mike" userId="7f3f83dd-6dfb-4127-a87f-c1714bd4fac9" providerId="ADAL" clId="{F6AE6E5C-FBA6-43D7-86C4-673D21C81915}" dt="2021-09-03T13:44:45.346" v="678" actId="478"/>
+          <ac:spMkLst>
+            <pc:docMk/>
+            <pc:sldMk cId="899949444" sldId="302"/>
+            <ac:spMk id="3" creationId="{8C589344-FA3A-4D02-B1F2-A870CB87247B}"/>
+          </ac:spMkLst>
+        </pc:spChg>
+        <pc:spChg chg="add mod">
+          <ac:chgData name="Hewner, Mike" userId="7f3f83dd-6dfb-4127-a87f-c1714bd4fac9" providerId="ADAL" clId="{F6AE6E5C-FBA6-43D7-86C4-673D21C81915}" dt="2021-09-03T14:05:26.337" v="1400" actId="1076"/>
+          <ac:spMkLst>
+            <pc:docMk/>
+            <pc:sldMk cId="899949444" sldId="302"/>
+            <ac:spMk id="4" creationId="{05F2C6F3-FD91-4C0E-86F7-445CBD0B167C}"/>
+          </ac:spMkLst>
+        </pc:spChg>
+        <pc:spChg chg="add mod">
+          <ac:chgData name="Hewner, Mike" userId="7f3f83dd-6dfb-4127-a87f-c1714bd4fac9" providerId="ADAL" clId="{F6AE6E5C-FBA6-43D7-86C4-673D21C81915}" dt="2021-09-03T14:05:26.337" v="1400" actId="1076"/>
+          <ac:spMkLst>
+            <pc:docMk/>
+            <pc:sldMk cId="899949444" sldId="302"/>
+            <ac:spMk id="5" creationId="{B068ABCB-97B3-475D-8CA2-4AA8DA66F5C5}"/>
+          </ac:spMkLst>
+        </pc:spChg>
+        <pc:spChg chg="add mod">
+          <ac:chgData name="Hewner, Mike" userId="7f3f83dd-6dfb-4127-a87f-c1714bd4fac9" providerId="ADAL" clId="{F6AE6E5C-FBA6-43D7-86C4-673D21C81915}" dt="2021-09-03T14:05:26.337" v="1400" actId="1076"/>
+          <ac:spMkLst>
+            <pc:docMk/>
+            <pc:sldMk cId="899949444" sldId="302"/>
+            <ac:spMk id="6" creationId="{FEFA48E9-AB5D-4802-A793-EB81B4A996CA}"/>
+          </ac:spMkLst>
+        </pc:spChg>
+        <pc:spChg chg="add mod">
+          <ac:chgData name="Hewner, Mike" userId="7f3f83dd-6dfb-4127-a87f-c1714bd4fac9" providerId="ADAL" clId="{F6AE6E5C-FBA6-43D7-86C4-673D21C81915}" dt="2021-09-03T14:05:26.337" v="1400" actId="1076"/>
+          <ac:spMkLst>
+            <pc:docMk/>
+            <pc:sldMk cId="899949444" sldId="302"/>
+            <ac:spMk id="8" creationId="{6D2219B1-A9A3-40ED-8D3D-F92178748361}"/>
+          </ac:spMkLst>
+        </pc:spChg>
+        <pc:spChg chg="add mod">
+          <ac:chgData name="Hewner, Mike" userId="7f3f83dd-6dfb-4127-a87f-c1714bd4fac9" providerId="ADAL" clId="{F6AE6E5C-FBA6-43D7-86C4-673D21C81915}" dt="2021-09-03T14:02:28.860" v="1324" actId="14100"/>
+          <ac:spMkLst>
+            <pc:docMk/>
+            <pc:sldMk cId="899949444" sldId="302"/>
+            <ac:spMk id="9" creationId="{BFF6CFAE-0306-41D6-B84E-E91209F1BFFF}"/>
+          </ac:spMkLst>
+        </pc:spChg>
+        <pc:spChg chg="add del mod">
+          <ac:chgData name="Hewner, Mike" userId="7f3f83dd-6dfb-4127-a87f-c1714bd4fac9" providerId="ADAL" clId="{F6AE6E5C-FBA6-43D7-86C4-673D21C81915}" dt="2021-09-03T14:03:04.835" v="1325" actId="21"/>
+          <ac:spMkLst>
+            <pc:docMk/>
+            <pc:sldMk cId="899949444" sldId="302"/>
+            <ac:spMk id="10" creationId="{84DD8E23-BA43-4AB1-A413-2F6E4D0494E9}"/>
+          </ac:spMkLst>
+        </pc:spChg>
+      </pc:sldChg>
+    </pc:docChg>
+  </pc:docChgLst>
+</pc:chgInfo>
+</file>
+
 <file path=ppt/handoutMasters/handoutMaster1.xml><?xml version="1.0" encoding="utf-8"?>
 <p:handoutMaster xmlns:a="http://schemas.openxmlformats.org/drawingml/2006/main" xmlns:r="http://schemas.openxmlformats.org/officeDocument/2006/relationships" xmlns:p="http://schemas.openxmlformats.org/presentationml/2006/main">
   <p:cSld>
@@ -249,7 +528,7 @@
           <a:p>
             <a:fld id="{36E807CB-EBCA-460F-BF84-60AF1AC8D23B}" type="datetimeFigureOut">
               <a:rPr lang="en-US" smtClean="0"/>
-              <a:t>11/30/2020</a:t>
+              <a:t>9/3/2021</a:t>
             </a:fld>
             <a:endParaRPr lang="en-US"/>
           </a:p>
@@ -423,7 +702,7 @@
               <a:pPr>
                 <a:defRPr/>
               </a:pPr>
-              <a:t>11/30/2020</a:t>
+              <a:t>9/3/2021</a:t>
             </a:fld>
             <a:endParaRPr lang="en-US"/>
           </a:p>
@@ -1231,33 +1510,24 @@
       </p:grpSpPr>
       <p:sp>
         <p:nvSpPr>
-          <p:cNvPr id="19458" name="Slide Image Placeholder 1"/>
+          <p:cNvPr id="2" name="Slide Image Placeholder 1"/>
           <p:cNvSpPr>
-            <a:spLocks noGrp="1" noRot="1" noChangeAspect="1" noTextEdit="1"/>
+            <a:spLocks noGrp="1" noRot="1" noChangeAspect="1"/>
           </p:cNvSpPr>
           <p:nvPr>
             <p:ph type="sldImg"/>
           </p:nvPr>
         </p:nvSpPr>
-        <p:spPr bwMode="auto">
+        <p:spPr>
           <a:xfrm>
             <a:off x="458788" y="720725"/>
             <a:ext cx="6399212" cy="3600450"/>
           </a:xfrm>
-          <a:noFill/>
-          <a:ln>
-            <a:solidFill>
-              <a:srgbClr val="000000"/>
-            </a:solidFill>
-            <a:miter lim="800000"/>
-            <a:headEnd/>
-            <a:tailEnd/>
-          </a:ln>
         </p:spPr>
       </p:sp>
       <p:sp>
         <p:nvSpPr>
-          <p:cNvPr id="19459" name="Notes Placeholder 2"/>
+          <p:cNvPr id="3" name="Notes Placeholder 2"/>
           <p:cNvSpPr>
             <a:spLocks noGrp="1"/>
           </p:cNvSpPr>
@@ -1265,54 +1535,38 @@
             <p:ph type="body" idx="1"/>
           </p:nvPr>
         </p:nvSpPr>
-        <p:spPr bwMode="auto">
-          <a:noFill/>
-        </p:spPr>
+        <p:spPr/>
         <p:txBody>
-          <a:bodyPr wrap="square" numCol="1" anchor="t" anchorCtr="0" compatLnSpc="1">
-            <a:prstTxWarp prst="textNoShape">
-              <a:avLst/>
-            </a:prstTxWarp>
-          </a:bodyPr>
+          <a:bodyPr/>
           <a:lstStyle/>
           <a:p>
-            <a:pPr eaLnBrk="1" hangingPunct="1"/>
-            <a:r>
-              <a:rPr lang="en-US" dirty="0"/>
-              <a:t>Hidden for 200930</a:t>
-            </a:r>
+            <a:endParaRPr lang="en-US" dirty="0"/>
           </a:p>
         </p:txBody>
       </p:sp>
       <p:sp>
         <p:nvSpPr>
-          <p:cNvPr id="19460" name="Slide Number Placeholder 3"/>
+          <p:cNvPr id="4" name="Slide Number Placeholder 3"/>
           <p:cNvSpPr>
             <a:spLocks noGrp="1"/>
           </p:cNvSpPr>
           <p:nvPr>
-            <p:ph type="sldNum" sz="quarter" idx="5"/>
+            <p:ph type="sldNum" sz="quarter" idx="10"/>
           </p:nvPr>
         </p:nvSpPr>
-        <p:spPr bwMode="auto">
-          <a:noFill/>
-          <a:ln>
-            <a:miter lim="800000"/>
-            <a:headEnd/>
-            <a:tailEnd/>
-          </a:ln>
-        </p:spPr>
+        <p:spPr/>
         <p:txBody>
-          <a:bodyPr wrap="square" numCol="1" anchorCtr="0" compatLnSpc="1">
-            <a:prstTxWarp prst="textNoShape">
-              <a:avLst/>
-            </a:prstTxWarp>
-          </a:bodyPr>
+          <a:bodyPr/>
           <a:lstStyle/>
           <a:p>
-            <a:fld id="{E31D9952-2D3D-4BC5-854F-C46F6A192002}" type="slidenum">
+            <a:pPr>
+              <a:defRPr/>
+            </a:pPr>
+            <a:fld id="{ED367815-639E-457E-93D8-BEA62ED23B32}" type="slidenum">
               <a:rPr lang="en-US" smtClean="0"/>
-              <a:pPr/>
+              <a:pPr>
+                <a:defRPr/>
+              </a:pPr>
               <a:t>7</a:t>
             </a:fld>
             <a:endParaRPr lang="en-US"/>
@@ -1322,7 +1576,7 @@
     </p:spTree>
     <p:extLst>
       <p:ext uri="{BB962C8B-B14F-4D97-AF65-F5344CB8AC3E}">
-        <p14:creationId xmlns:p14="http://schemas.microsoft.com/office/powerpoint/2010/main" val="296210151"/>
+        <p14:creationId xmlns:p14="http://schemas.microsoft.com/office/powerpoint/2010/main" val="3030281845"/>
       </p:ext>
     </p:extLst>
   </p:cSld>
@@ -1378,101 +1632,6 @@
         </p:nvSpPr>
         <p:spPr/>
         <p:txBody>
-          <a:bodyPr/>
-          <a:lstStyle/>
-          <a:p>
-            <a:endParaRPr lang="en-US" dirty="0"/>
-          </a:p>
-        </p:txBody>
-      </p:sp>
-      <p:sp>
-        <p:nvSpPr>
-          <p:cNvPr id="4" name="Slide Number Placeholder 3"/>
-          <p:cNvSpPr>
-            <a:spLocks noGrp="1"/>
-          </p:cNvSpPr>
-          <p:nvPr>
-            <p:ph type="sldNum" sz="quarter" idx="10"/>
-          </p:nvPr>
-        </p:nvSpPr>
-        <p:spPr/>
-        <p:txBody>
-          <a:bodyPr/>
-          <a:lstStyle/>
-          <a:p>
-            <a:pPr>
-              <a:defRPr/>
-            </a:pPr>
-            <a:fld id="{ED367815-639E-457E-93D8-BEA62ED23B32}" type="slidenum">
-              <a:rPr lang="en-US" smtClean="0"/>
-              <a:pPr>
-                <a:defRPr/>
-              </a:pPr>
-              <a:t>8</a:t>
-            </a:fld>
-            <a:endParaRPr lang="en-US"/>
-          </a:p>
-        </p:txBody>
-      </p:sp>
-    </p:spTree>
-    <p:extLst>
-      <p:ext uri="{BB962C8B-B14F-4D97-AF65-F5344CB8AC3E}">
-        <p14:creationId xmlns:p14="http://schemas.microsoft.com/office/powerpoint/2010/main" val="3030281845"/>
-      </p:ext>
-    </p:extLst>
-  </p:cSld>
-  <p:clrMapOvr>
-    <a:masterClrMapping/>
-  </p:clrMapOvr>
-</p:notes>
-</file>
-
-<file path=ppt/notesSlides/notesSlide7.xml><?xml version="1.0" encoding="utf-8"?>
-<p:notes xmlns:a="http://schemas.openxmlformats.org/drawingml/2006/main" xmlns:r="http://schemas.openxmlformats.org/officeDocument/2006/relationships" xmlns:p="http://schemas.openxmlformats.org/presentationml/2006/main">
-  <p:cSld>
-    <p:spTree>
-      <p:nvGrpSpPr>
-        <p:cNvPr id="1" name=""/>
-        <p:cNvGrpSpPr/>
-        <p:nvPr/>
-      </p:nvGrpSpPr>
-      <p:grpSpPr>
-        <a:xfrm>
-          <a:off x="0" y="0"/>
-          <a:ext cx="0" cy="0"/>
-          <a:chOff x="0" y="0"/>
-          <a:chExt cx="0" cy="0"/>
-        </a:xfrm>
-      </p:grpSpPr>
-      <p:sp>
-        <p:nvSpPr>
-          <p:cNvPr id="2" name="Slide Image Placeholder 1"/>
-          <p:cNvSpPr>
-            <a:spLocks noGrp="1" noRot="1" noChangeAspect="1"/>
-          </p:cNvSpPr>
-          <p:nvPr>
-            <p:ph type="sldImg"/>
-          </p:nvPr>
-        </p:nvSpPr>
-        <p:spPr>
-          <a:xfrm>
-            <a:off x="458788" y="720725"/>
-            <a:ext cx="6399212" cy="3600450"/>
-          </a:xfrm>
-        </p:spPr>
-      </p:sp>
-      <p:sp>
-        <p:nvSpPr>
-          <p:cNvPr id="3" name="Notes Placeholder 2"/>
-          <p:cNvSpPr>
-            <a:spLocks noGrp="1"/>
-          </p:cNvSpPr>
-          <p:nvPr>
-            <p:ph type="body" idx="1"/>
-          </p:nvPr>
-        </p:nvSpPr>
-        <p:spPr/>
-        <p:txBody>
           <a:bodyPr>
             <a:normAutofit fontScale="92500" lnSpcReduction="20000"/>
           </a:bodyPr>
@@ -1739,7 +1898,7 @@
             <a:fld id="{F352D5B2-AE34-4C55-AB6F-517E1ACFB39F}" type="slidenum">
               <a:rPr lang="en-US" smtClean="0"/>
               <a:pPr/>
-              <a:t>9</a:t>
+              <a:t>10</a:t>
             </a:fld>
             <a:endParaRPr lang="en-US"/>
           </a:p>
@@ -16327,49 +16486,7 @@
             </a:pPr>
             <a:r>
               <a:rPr lang="en-US" dirty="0"/>
-              <a:t>More Recursive Procedures</a:t>
-            </a:r>
-          </a:p>
-        </p:txBody>
-      </p:sp>
-      <p:sp>
-        <p:nvSpPr>
-          <p:cNvPr id="3076" name="TextBox 3"/>
-          <p:cNvSpPr txBox="1">
-            <a:spLocks noChangeArrowheads="1"/>
-          </p:cNvSpPr>
-          <p:nvPr/>
-        </p:nvSpPr>
-        <p:spPr bwMode="auto">
-          <a:xfrm>
-            <a:off x="2362200" y="5800725"/>
-            <a:ext cx="7696200" cy="954107"/>
-          </a:xfrm>
-          <a:prstGeom prst="rect">
-            <a:avLst/>
-          </a:prstGeom>
-          <a:noFill/>
-          <a:ln w="9525">
-            <a:noFill/>
-            <a:miter lim="800000"/>
-            <a:headEnd/>
-            <a:tailEnd/>
-          </a:ln>
-        </p:spPr>
-        <p:txBody>
-          <a:bodyPr>
-            <a:spAutoFit/>
-          </a:bodyPr>
-          <a:lstStyle/>
-          <a:p>
-            <a:pPr algn="ctr"/>
-            <a:r>
-              <a:rPr lang="en-US" sz="2800" dirty="0">
-                <a:solidFill>
-                  <a:srgbClr val="FFFF00"/>
-                </a:solidFill>
-              </a:rPr>
-              <a:t>Submit your Assignment 0 hand-in sheet to the drop box on Moodle</a:t>
+              <a:t>Basic Lambda &amp; Recursion</a:t>
             </a:r>
           </a:p>
         </p:txBody>
@@ -16382,1178 +16499,7 @@
 </p:sld>
 </file>
 
-<file path=ppt/slides/slide2.xml><?xml version="1.0" encoding="utf-8"?>
-<p:sld xmlns:a="http://schemas.openxmlformats.org/drawingml/2006/main" xmlns:r="http://schemas.openxmlformats.org/officeDocument/2006/relationships" xmlns:p="http://schemas.openxmlformats.org/presentationml/2006/main">
-  <p:cSld>
-    <p:spTree>
-      <p:nvGrpSpPr>
-        <p:cNvPr id="1" name=""/>
-        <p:cNvGrpSpPr/>
-        <p:nvPr/>
-      </p:nvGrpSpPr>
-      <p:grpSpPr>
-        <a:xfrm>
-          <a:off x="0" y="0"/>
-          <a:ext cx="0" cy="0"/>
-          <a:chOff x="0" y="0"/>
-          <a:chExt cx="0" cy="0"/>
-        </a:xfrm>
-      </p:grpSpPr>
-      <p:sp>
-        <p:nvSpPr>
-          <p:cNvPr id="2" name="Title 1">
-            <a:extLst>
-              <a:ext uri="{FF2B5EF4-FFF2-40B4-BE49-F238E27FC236}">
-                <a16:creationId xmlns:a16="http://schemas.microsoft.com/office/drawing/2014/main" id="{A8B517EA-78A1-49F4-A495-5150B9F0D117}"/>
-              </a:ext>
-            </a:extLst>
-          </p:cNvPr>
-          <p:cNvSpPr>
-            <a:spLocks noGrp="1"/>
-          </p:cNvSpPr>
-          <p:nvPr>
-            <p:ph type="title"/>
-          </p:nvPr>
-        </p:nvSpPr>
-        <p:spPr/>
-        <p:txBody>
-          <a:bodyPr/>
-          <a:lstStyle/>
-          <a:p>
-            <a:r>
-              <a:rPr lang="en-US" dirty="0"/>
-              <a:t>Finding today’s starting code</a:t>
-            </a:r>
-          </a:p>
-        </p:txBody>
-      </p:sp>
-      <p:sp>
-        <p:nvSpPr>
-          <p:cNvPr id="3" name="Content Placeholder 2">
-            <a:extLst>
-              <a:ext uri="{FF2B5EF4-FFF2-40B4-BE49-F238E27FC236}">
-                <a16:creationId xmlns:a16="http://schemas.microsoft.com/office/drawing/2014/main" id="{20358E11-049B-40D2-82DB-949F2568C944}"/>
-              </a:ext>
-            </a:extLst>
-          </p:cNvPr>
-          <p:cNvSpPr>
-            <a:spLocks noGrp="1"/>
-          </p:cNvSpPr>
-          <p:nvPr>
-            <p:ph idx="1"/>
-          </p:nvPr>
-        </p:nvSpPr>
-        <p:spPr>
-          <a:xfrm>
-            <a:off x="152400" y="1600201"/>
-            <a:ext cx="11887200" cy="4530725"/>
-          </a:xfrm>
-        </p:spPr>
-        <p:txBody>
-          <a:bodyPr/>
-          <a:lstStyle/>
-          <a:p>
-            <a:pPr marL="514350" indent="-514350">
-              <a:buFont typeface="+mj-lt"/>
-              <a:buAutoNum type="arabicPeriod"/>
-            </a:pPr>
-            <a:r>
-              <a:rPr lang="en-US" dirty="0"/>
-              <a:t>Go to the </a:t>
-            </a:r>
-            <a:r>
-              <a:rPr lang="en-US" dirty="0">
-                <a:solidFill>
-                  <a:srgbClr val="FFFF00"/>
-                </a:solidFill>
-              </a:rPr>
-              <a:t>Live-in-class</a:t>
-            </a:r>
-            <a:r>
-              <a:rPr lang="en-US" dirty="0"/>
-              <a:t> folder.  Two ways to find it:</a:t>
-            </a:r>
-          </a:p>
-          <a:p>
-            <a:pPr lvl="1"/>
-            <a:r>
-              <a:rPr lang="en-US" dirty="0"/>
-              <a:t>Schedule page, Session 1 Resources,  sixth bulleted item.</a:t>
-            </a:r>
-          </a:p>
-          <a:p>
-            <a:pPr lvl="1"/>
-            <a:r>
-              <a:rPr lang="en-US" dirty="0"/>
-              <a:t>Moodle page, Important External links,  the last link.</a:t>
-            </a:r>
-          </a:p>
-          <a:p>
-            <a:pPr marL="514350" indent="-514350">
-              <a:buFont typeface="+mj-lt"/>
-              <a:buAutoNum type="arabicPeriod"/>
-            </a:pPr>
-            <a:r>
-              <a:rPr lang="en-US" dirty="0"/>
-              <a:t>Click the </a:t>
-            </a:r>
-            <a:r>
-              <a:rPr lang="en-US" dirty="0">
-                <a:solidFill>
-                  <a:srgbClr val="FFFF00"/>
-                </a:solidFill>
-              </a:rPr>
-              <a:t>Day 02 in-class </a:t>
-            </a:r>
-            <a:r>
-              <a:rPr lang="en-US" dirty="0"/>
-              <a:t>link.</a:t>
-            </a:r>
-          </a:p>
-          <a:p>
-            <a:pPr marL="514350" indent="-514350">
-              <a:buFont typeface="+mj-lt"/>
-              <a:buAutoNum type="arabicPeriod"/>
-            </a:pPr>
-            <a:r>
-              <a:rPr lang="en-US" dirty="0"/>
-              <a:t>Get the code for your section.</a:t>
-            </a:r>
-          </a:p>
-        </p:txBody>
-      </p:sp>
-    </p:spTree>
-    <p:extLst>
-      <p:ext uri="{BB962C8B-B14F-4D97-AF65-F5344CB8AC3E}">
-        <p14:creationId xmlns:p14="http://schemas.microsoft.com/office/powerpoint/2010/main" val="2879101978"/>
-      </p:ext>
-    </p:extLst>
-  </p:cSld>
-  <p:clrMapOvr>
-    <a:masterClrMapping/>
-  </p:clrMapOvr>
-</p:sld>
-</file>
-
-<file path=ppt/slides/slide3.xml><?xml version="1.0" encoding="utf-8"?>
-<p:sld xmlns:a="http://schemas.openxmlformats.org/drawingml/2006/main" xmlns:r="http://schemas.openxmlformats.org/officeDocument/2006/relationships" xmlns:p="http://schemas.openxmlformats.org/presentationml/2006/main">
-  <p:cSld>
-    <p:spTree>
-      <p:nvGrpSpPr>
-        <p:cNvPr id="1" name=""/>
-        <p:cNvGrpSpPr/>
-        <p:nvPr/>
-      </p:nvGrpSpPr>
-      <p:grpSpPr>
-        <a:xfrm>
-          <a:off x="0" y="0"/>
-          <a:ext cx="0" cy="0"/>
-          <a:chOff x="0" y="0"/>
-          <a:chExt cx="0" cy="0"/>
-        </a:xfrm>
-      </p:grpSpPr>
-      <p:sp>
-        <p:nvSpPr>
-          <p:cNvPr id="293890" name="Rectangle 2"/>
-          <p:cNvSpPr>
-            <a:spLocks noGrp="1" noChangeArrowheads="1"/>
-          </p:cNvSpPr>
-          <p:nvPr>
-            <p:ph type="title"/>
-          </p:nvPr>
-        </p:nvSpPr>
-        <p:spPr>
-          <a:xfrm>
-            <a:off x="1981200" y="76201"/>
-            <a:ext cx="8229600" cy="1139825"/>
-          </a:xfrm>
-        </p:spPr>
-        <p:txBody>
-          <a:bodyPr/>
-          <a:lstStyle/>
-          <a:p>
-            <a:pPr eaLnBrk="1" hangingPunct="1">
-              <a:defRPr/>
-            </a:pPr>
-            <a:r>
-              <a:rPr lang="en-US" dirty="0"/>
-              <a:t>Day 2 things to do</a:t>
-            </a:r>
-          </a:p>
-        </p:txBody>
-      </p:sp>
-      <p:sp>
-        <p:nvSpPr>
-          <p:cNvPr id="293891" name="Rectangle 3"/>
-          <p:cNvSpPr>
-            <a:spLocks noGrp="1" noChangeArrowheads="1"/>
-          </p:cNvSpPr>
-          <p:nvPr>
-            <p:ph type="body" idx="1"/>
-          </p:nvPr>
-        </p:nvSpPr>
-        <p:spPr>
-          <a:xfrm>
-            <a:off x="762000" y="1143000"/>
-            <a:ext cx="10439400" cy="4419600"/>
-          </a:xfrm>
-        </p:spPr>
-        <p:txBody>
-          <a:bodyPr/>
-          <a:lstStyle/>
-          <a:p>
-            <a:pPr eaLnBrk="1" hangingPunct="1">
-              <a:defRPr/>
-            </a:pPr>
-            <a:r>
-              <a:rPr lang="en-US" sz="2800" dirty="0"/>
-              <a:t>Your non-Scheme questions </a:t>
-            </a:r>
-          </a:p>
-          <a:p>
-            <a:pPr eaLnBrk="1" hangingPunct="1">
-              <a:defRPr/>
-            </a:pPr>
-            <a:r>
-              <a:rPr lang="en-US" sz="2800" dirty="0"/>
-              <a:t>Your Scheme Questions</a:t>
-            </a:r>
-          </a:p>
-          <a:p>
-            <a:pPr eaLnBrk="1" hangingPunct="1">
-              <a:defRPr/>
-            </a:pPr>
-            <a:r>
-              <a:rPr lang="en-US" sz="2800" dirty="0"/>
-              <a:t>Run the A1 offline  test code</a:t>
-            </a:r>
-          </a:p>
-          <a:p>
-            <a:pPr eaLnBrk="1" hangingPunct="1">
-              <a:defRPr/>
-            </a:pPr>
-            <a:r>
-              <a:rPr lang="en-US" sz="2800" dirty="0"/>
-              <a:t>More recursive procedures (together)</a:t>
-            </a:r>
-          </a:p>
-          <a:p>
-            <a:pPr eaLnBrk="1" hangingPunct="1">
-              <a:defRPr/>
-            </a:pPr>
-            <a:r>
-              <a:rPr lang="en-US" sz="2800" dirty="0"/>
-              <a:t>Still more recursive procedures (in breakout rooms)</a:t>
-            </a:r>
-          </a:p>
-          <a:p>
-            <a:pPr eaLnBrk="1" hangingPunct="1">
-              <a:defRPr/>
-            </a:pPr>
-            <a:endParaRPr lang="en-US" sz="2800" dirty="0"/>
-          </a:p>
-          <a:p>
-            <a:pPr eaLnBrk="1" hangingPunct="1">
-              <a:defRPr/>
-            </a:pPr>
-            <a:endParaRPr lang="en-US" sz="2800" dirty="0"/>
-          </a:p>
-        </p:txBody>
-      </p:sp>
-    </p:spTree>
-  </p:cSld>
-  <p:clrMapOvr>
-    <a:masterClrMapping/>
-  </p:clrMapOvr>
-</p:sld>
-</file>
-
-<file path=ppt/slides/slide4.xml><?xml version="1.0" encoding="utf-8"?>
-<p:sld xmlns:a="http://schemas.openxmlformats.org/drawingml/2006/main" xmlns:r="http://schemas.openxmlformats.org/officeDocument/2006/relationships" xmlns:p="http://schemas.openxmlformats.org/presentationml/2006/main">
-  <p:cSld>
-    <p:spTree>
-      <p:nvGrpSpPr>
-        <p:cNvPr id="1" name=""/>
-        <p:cNvGrpSpPr/>
-        <p:nvPr/>
-      </p:nvGrpSpPr>
-      <p:grpSpPr>
-        <a:xfrm>
-          <a:off x="0" y="0"/>
-          <a:ext cx="0" cy="0"/>
-          <a:chOff x="0" y="0"/>
-          <a:chExt cx="0" cy="0"/>
-        </a:xfrm>
-      </p:grpSpPr>
-      <p:sp>
-        <p:nvSpPr>
-          <p:cNvPr id="87042" name="Rectangle 2"/>
-          <p:cNvSpPr>
-            <a:spLocks noGrp="1" noChangeArrowheads="1"/>
-          </p:cNvSpPr>
-          <p:nvPr>
-            <p:ph type="title"/>
-          </p:nvPr>
-        </p:nvSpPr>
-        <p:spPr>
-          <a:xfrm>
-            <a:off x="1981200" y="155576"/>
-            <a:ext cx="8229600" cy="1139825"/>
-          </a:xfrm>
-        </p:spPr>
-        <p:txBody>
-          <a:bodyPr/>
-          <a:lstStyle/>
-          <a:p>
-            <a:r>
-              <a:rPr lang="en-US" dirty="0"/>
-              <a:t>Students Questions</a:t>
-            </a:r>
-          </a:p>
-        </p:txBody>
-      </p:sp>
-      <p:sp>
-        <p:nvSpPr>
-          <p:cNvPr id="87043" name="Rectangle 3"/>
-          <p:cNvSpPr>
-            <a:spLocks noGrp="1" noChangeArrowheads="1"/>
-          </p:cNvSpPr>
-          <p:nvPr>
-            <p:ph type="body" idx="1"/>
-          </p:nvPr>
-        </p:nvSpPr>
-        <p:spPr>
-          <a:xfrm>
-            <a:off x="990600" y="1717675"/>
-            <a:ext cx="10363200" cy="4530725"/>
-          </a:xfrm>
-        </p:spPr>
-        <p:txBody>
-          <a:bodyPr/>
-          <a:lstStyle/>
-          <a:p>
-            <a:r>
-              <a:rPr lang="en-US" dirty="0"/>
-              <a:t>Questions about the syllabus or course policies?</a:t>
-            </a:r>
-          </a:p>
-          <a:p>
-            <a:endParaRPr lang="en-US" dirty="0"/>
-          </a:p>
-          <a:p>
-            <a:r>
-              <a:rPr lang="en-US" dirty="0"/>
-              <a:t>Questions about installation, tool use, etc.?</a:t>
-            </a:r>
-            <a:br>
-              <a:rPr lang="en-US" dirty="0"/>
-            </a:br>
-            <a:endParaRPr lang="en-US" dirty="0"/>
-          </a:p>
-          <a:p>
-            <a:r>
-              <a:rPr lang="en-US" dirty="0"/>
-              <a:t>Questions about Scheme?</a:t>
-            </a:r>
-            <a:br>
-              <a:rPr lang="en-US" dirty="0"/>
-            </a:br>
-            <a:endParaRPr lang="en-US" dirty="0"/>
-          </a:p>
-          <a:p>
-            <a:endParaRPr lang="en-US" dirty="0"/>
-          </a:p>
-        </p:txBody>
-      </p:sp>
-    </p:spTree>
-    <p:extLst>
-      <p:ext uri="{BB962C8B-B14F-4D97-AF65-F5344CB8AC3E}">
-        <p14:creationId xmlns:p14="http://schemas.microsoft.com/office/powerpoint/2010/main" val="1059650853"/>
-      </p:ext>
-    </p:extLst>
-  </p:cSld>
-  <p:clrMapOvr>
-    <a:masterClrMapping/>
-  </p:clrMapOvr>
-</p:sld>
-</file>
-
-<file path=ppt/slides/slide5.xml><?xml version="1.0" encoding="utf-8"?>
-<p:sld xmlns:a="http://schemas.openxmlformats.org/drawingml/2006/main" xmlns:r="http://schemas.openxmlformats.org/officeDocument/2006/relationships" xmlns:p="http://schemas.openxmlformats.org/presentationml/2006/main">
-  <p:cSld>
-    <p:spTree>
-      <p:nvGrpSpPr>
-        <p:cNvPr id="1" name=""/>
-        <p:cNvGrpSpPr/>
-        <p:nvPr/>
-      </p:nvGrpSpPr>
-      <p:grpSpPr>
-        <a:xfrm>
-          <a:off x="0" y="0"/>
-          <a:ext cx="0" cy="0"/>
-          <a:chOff x="0" y="0"/>
-          <a:chExt cx="0" cy="0"/>
-        </a:xfrm>
-      </p:grpSpPr>
-      <p:sp>
-        <p:nvSpPr>
-          <p:cNvPr id="92162" name="Rectangle 2"/>
-          <p:cNvSpPr>
-            <a:spLocks noGrp="1" noChangeArrowheads="1"/>
-          </p:cNvSpPr>
-          <p:nvPr>
-            <p:ph type="title"/>
-          </p:nvPr>
-        </p:nvSpPr>
-        <p:spPr/>
-        <p:txBody>
-          <a:bodyPr/>
-          <a:lstStyle/>
-          <a:p>
-            <a:r>
-              <a:rPr lang="en-US" dirty="0"/>
-              <a:t>Running my test code on your own computer</a:t>
-            </a:r>
-          </a:p>
-        </p:txBody>
-      </p:sp>
-      <p:sp>
-        <p:nvSpPr>
-          <p:cNvPr id="92163" name="Rectangle 3"/>
-          <p:cNvSpPr>
-            <a:spLocks noGrp="1" noChangeArrowheads="1"/>
-          </p:cNvSpPr>
-          <p:nvPr>
-            <p:ph type="body" idx="1"/>
-          </p:nvPr>
-        </p:nvSpPr>
-        <p:spPr/>
-        <p:txBody>
-          <a:bodyPr/>
-          <a:lstStyle/>
-          <a:p>
-            <a:r>
-              <a:rPr lang="en-US" dirty="0"/>
-              <a:t>I will demonstrate this in SWL (now) and Emacs (when we do the live coding).</a:t>
-            </a:r>
-          </a:p>
-        </p:txBody>
-      </p:sp>
-    </p:spTree>
-    <p:extLst>
-      <p:ext uri="{BB962C8B-B14F-4D97-AF65-F5344CB8AC3E}">
-        <p14:creationId xmlns:p14="http://schemas.microsoft.com/office/powerpoint/2010/main" val="136193430"/>
-      </p:ext>
-    </p:extLst>
-  </p:cSld>
-  <p:clrMapOvr>
-    <a:masterClrMapping/>
-  </p:clrMapOvr>
-</p:sld>
-</file>
-
-<file path=ppt/slides/slide6.xml><?xml version="1.0" encoding="utf-8"?>
-<p:sld xmlns:a="http://schemas.openxmlformats.org/drawingml/2006/main" xmlns:r="http://schemas.openxmlformats.org/officeDocument/2006/relationships" xmlns:p="http://schemas.openxmlformats.org/presentationml/2006/main">
-  <p:cSld>
-    <p:spTree>
-      <p:nvGrpSpPr>
-        <p:cNvPr id="1" name=""/>
-        <p:cNvGrpSpPr/>
-        <p:nvPr/>
-      </p:nvGrpSpPr>
-      <p:grpSpPr>
-        <a:xfrm>
-          <a:off x="0" y="0"/>
-          <a:ext cx="0" cy="0"/>
-          <a:chOff x="0" y="0"/>
-          <a:chExt cx="0" cy="0"/>
-        </a:xfrm>
-      </p:grpSpPr>
-      <p:sp>
-        <p:nvSpPr>
-          <p:cNvPr id="2" name="Title 1">
-            <a:extLst>
-              <a:ext uri="{FF2B5EF4-FFF2-40B4-BE49-F238E27FC236}">
-                <a16:creationId xmlns:a16="http://schemas.microsoft.com/office/drawing/2014/main" id="{1872CA25-BAC8-45A0-B8BD-F8BAC92EFF1B}"/>
-              </a:ext>
-            </a:extLst>
-          </p:cNvPr>
-          <p:cNvSpPr>
-            <a:spLocks noGrp="1"/>
-          </p:cNvSpPr>
-          <p:nvPr>
-            <p:ph type="title"/>
-          </p:nvPr>
-        </p:nvSpPr>
-        <p:spPr/>
-        <p:txBody>
-          <a:bodyPr/>
-          <a:lstStyle/>
-          <a:p>
-            <a:r>
-              <a:rPr lang="en-US" dirty="0"/>
-              <a:t>Interlude</a:t>
-            </a:r>
-          </a:p>
-        </p:txBody>
-      </p:sp>
-      <p:pic>
-        <p:nvPicPr>
-          <p:cNvPr id="5" name="Content Placeholder 4" descr="A close up of text on a black background&#10;&#10;Description generated with high confidence">
-            <a:extLst>
-              <a:ext uri="{FF2B5EF4-FFF2-40B4-BE49-F238E27FC236}">
-                <a16:creationId xmlns:a16="http://schemas.microsoft.com/office/drawing/2014/main" id="{1AFC7C03-5A7D-46B0-8647-2CB6B3E82697}"/>
-              </a:ext>
-            </a:extLst>
-          </p:cNvPr>
-          <p:cNvPicPr>
-            <a:picLocks noGrp="1" noChangeAspect="1"/>
-          </p:cNvPicPr>
-          <p:nvPr>
-            <p:ph idx="1"/>
-          </p:nvPr>
-        </p:nvPicPr>
-        <p:blipFill>
-          <a:blip r:embed="rId2">
-            <a:extLst>
-              <a:ext uri="{28A0092B-C50C-407E-A947-70E740481C1C}">
-                <a14:useLocalDpi xmlns:a14="http://schemas.microsoft.com/office/drawing/2010/main" val="0"/>
-              </a:ext>
-            </a:extLst>
-          </a:blip>
-          <a:stretch>
-            <a:fillRect/>
-          </a:stretch>
-        </p:blipFill>
-        <p:spPr>
-          <a:xfrm>
-            <a:off x="1676400" y="1837376"/>
-            <a:ext cx="8839200" cy="3183248"/>
-          </a:xfrm>
-        </p:spPr>
-      </p:pic>
-    </p:spTree>
-    <p:extLst>
-      <p:ext uri="{BB962C8B-B14F-4D97-AF65-F5344CB8AC3E}">
-        <p14:creationId xmlns:p14="http://schemas.microsoft.com/office/powerpoint/2010/main" val="2171581171"/>
-      </p:ext>
-    </p:extLst>
-  </p:cSld>
-  <p:clrMapOvr>
-    <a:masterClrMapping/>
-  </p:clrMapOvr>
-</p:sld>
-</file>
-
-<file path=ppt/slides/slide7.xml><?xml version="1.0" encoding="utf-8"?>
-<p:sld xmlns:a="http://schemas.openxmlformats.org/drawingml/2006/main" xmlns:r="http://schemas.openxmlformats.org/officeDocument/2006/relationships" xmlns:p="http://schemas.openxmlformats.org/presentationml/2006/main" show="0">
-  <p:cSld>
-    <p:spTree>
-      <p:nvGrpSpPr>
-        <p:cNvPr id="1" name=""/>
-        <p:cNvGrpSpPr/>
-        <p:nvPr/>
-      </p:nvGrpSpPr>
-      <p:grpSpPr>
-        <a:xfrm>
-          <a:off x="0" y="0"/>
-          <a:ext cx="0" cy="0"/>
-          <a:chOff x="0" y="0"/>
-          <a:chExt cx="0" cy="0"/>
-        </a:xfrm>
-      </p:grpSpPr>
-      <p:sp>
-        <p:nvSpPr>
-          <p:cNvPr id="299010" name="Rectangle 2"/>
-          <p:cNvSpPr>
-            <a:spLocks noGrp="1" noChangeArrowheads="1"/>
-          </p:cNvSpPr>
-          <p:nvPr>
-            <p:ph type="title"/>
-          </p:nvPr>
-        </p:nvSpPr>
-        <p:spPr>
-          <a:xfrm>
-            <a:off x="1981200" y="-152400"/>
-            <a:ext cx="8229600" cy="1139825"/>
-          </a:xfrm>
-        </p:spPr>
-        <p:txBody>
-          <a:bodyPr/>
-          <a:lstStyle/>
-          <a:p>
-            <a:pPr eaLnBrk="1" hangingPunct="1">
-              <a:defRPr/>
-            </a:pPr>
-            <a:r>
-              <a:rPr lang="en-US" b="1" dirty="0"/>
-              <a:t>Interlude</a:t>
-            </a:r>
-            <a:endParaRPr lang="en-US" dirty="0"/>
-          </a:p>
-        </p:txBody>
-      </p:sp>
-      <p:sp>
-        <p:nvSpPr>
-          <p:cNvPr id="299011" name="Rectangle 3"/>
-          <p:cNvSpPr>
-            <a:spLocks noGrp="1" noChangeArrowheads="1"/>
-          </p:cNvSpPr>
-          <p:nvPr>
-            <p:ph type="body" idx="1"/>
-          </p:nvPr>
-        </p:nvSpPr>
-        <p:spPr>
-          <a:xfrm>
-            <a:off x="1219200" y="955676"/>
-            <a:ext cx="9982200" cy="7350125"/>
-          </a:xfrm>
-        </p:spPr>
-        <p:txBody>
-          <a:bodyPr/>
-          <a:lstStyle/>
-          <a:p>
-            <a:pPr eaLnBrk="1" hangingPunct="1">
-              <a:spcAft>
-                <a:spcPts val="600"/>
-              </a:spcAft>
-              <a:buNone/>
-              <a:defRPr/>
-            </a:pPr>
-            <a:r>
-              <a:rPr lang="en-US" dirty="0"/>
-              <a:t> Tom </a:t>
-            </a:r>
-            <a:r>
-              <a:rPr lang="en-US" dirty="0" err="1"/>
-              <a:t>Swifties</a:t>
-            </a:r>
-            <a:r>
-              <a:rPr lang="en-US" dirty="0"/>
-              <a:t> (most from Wikipedia):</a:t>
-            </a:r>
-          </a:p>
-          <a:p>
-            <a:pPr eaLnBrk="1" hangingPunct="1">
-              <a:spcBef>
-                <a:spcPts val="300"/>
-              </a:spcBef>
-              <a:spcAft>
-                <a:spcPts val="300"/>
-              </a:spcAft>
-              <a:buNone/>
-              <a:defRPr/>
-            </a:pPr>
-            <a:r>
-              <a:rPr lang="en-US" sz="1900" dirty="0"/>
-              <a:t>"Who left the toilet seat down?" Tom asked peevishly. </a:t>
-            </a:r>
-          </a:p>
-          <a:p>
-            <a:pPr eaLnBrk="1" hangingPunct="1">
-              <a:spcBef>
-                <a:spcPts val="300"/>
-              </a:spcBef>
-              <a:spcAft>
-                <a:spcPts val="300"/>
-              </a:spcAft>
-              <a:buNone/>
-              <a:defRPr/>
-            </a:pPr>
-            <a:r>
-              <a:rPr lang="en-US" sz="1900" dirty="0"/>
-              <a:t>"I'll never again put my arm in a lion's mouth," Tom said off-handedly. </a:t>
-            </a:r>
-          </a:p>
-          <a:p>
-            <a:pPr eaLnBrk="1" hangingPunct="1">
-              <a:spcBef>
-                <a:spcPts val="300"/>
-              </a:spcBef>
-              <a:spcAft>
-                <a:spcPts val="300"/>
-              </a:spcAft>
-              <a:buNone/>
-              <a:defRPr/>
-            </a:pPr>
-            <a:r>
-              <a:rPr lang="en-US" sz="1900" dirty="0"/>
-              <a:t>"Can I go looking for the Holy Grail again?" Tom requested. </a:t>
-            </a:r>
-          </a:p>
-          <a:p>
-            <a:pPr eaLnBrk="1" hangingPunct="1">
-              <a:spcBef>
-                <a:spcPts val="300"/>
-              </a:spcBef>
-              <a:spcAft>
-                <a:spcPts val="300"/>
-              </a:spcAft>
-              <a:buNone/>
-              <a:defRPr/>
-            </a:pPr>
-            <a:r>
-              <a:rPr lang="en-US" sz="1900" dirty="0"/>
-              <a:t>"I unclogged the drain with a vacuum cleaner," Tom said succinctly. </a:t>
-            </a:r>
-          </a:p>
-          <a:p>
-            <a:pPr eaLnBrk="1" hangingPunct="1">
-              <a:spcBef>
-                <a:spcPts val="300"/>
-              </a:spcBef>
-              <a:spcAft>
-                <a:spcPts val="300"/>
-              </a:spcAft>
-              <a:buNone/>
-              <a:defRPr/>
-            </a:pPr>
-            <a:r>
-              <a:rPr lang="en-US" sz="1900" dirty="0"/>
-              <a:t>"We just struck oil!" Tom gushed. </a:t>
-            </a:r>
-          </a:p>
-          <a:p>
-            <a:pPr eaLnBrk="1" hangingPunct="1">
-              <a:spcBef>
-                <a:spcPts val="300"/>
-              </a:spcBef>
-              <a:spcAft>
-                <a:spcPts val="300"/>
-              </a:spcAft>
-              <a:buNone/>
-              <a:defRPr/>
-            </a:pPr>
-            <a:r>
-              <a:rPr lang="en-US" sz="1900" dirty="0"/>
-              <a:t>"They had to amputate them both at the ankles," Tom said </a:t>
-            </a:r>
-            <a:r>
-              <a:rPr lang="en-US" sz="1900" dirty="0" err="1"/>
-              <a:t>defeatedly</a:t>
-            </a:r>
-            <a:r>
-              <a:rPr lang="en-US" sz="1900" dirty="0"/>
-              <a:t>. </a:t>
-            </a:r>
-          </a:p>
-          <a:p>
-            <a:pPr eaLnBrk="1" hangingPunct="1">
-              <a:spcBef>
-                <a:spcPts val="300"/>
-              </a:spcBef>
-              <a:spcAft>
-                <a:spcPts val="300"/>
-              </a:spcAft>
-              <a:buNone/>
-              <a:defRPr/>
-            </a:pPr>
-            <a:r>
-              <a:rPr lang="en-US" sz="1900" dirty="0"/>
-              <a:t>"Who discovered radium?" asked Marie curiously. </a:t>
-            </a:r>
-          </a:p>
-          <a:p>
-            <a:pPr eaLnBrk="1" hangingPunct="1">
-              <a:spcBef>
-                <a:spcPts val="300"/>
-              </a:spcBef>
-              <a:spcAft>
-                <a:spcPts val="300"/>
-              </a:spcAft>
-              <a:buNone/>
-              <a:defRPr/>
-            </a:pPr>
-            <a:r>
-              <a:rPr lang="en-US" sz="1900" dirty="0"/>
-              <a:t>"Hurry up and get to the back of the ship," Tom said sternly. </a:t>
-            </a:r>
-          </a:p>
-          <a:p>
-            <a:pPr eaLnBrk="1" hangingPunct="1">
-              <a:spcBef>
-                <a:spcPts val="300"/>
-              </a:spcBef>
-              <a:spcAft>
-                <a:spcPts val="300"/>
-              </a:spcAft>
-              <a:buNone/>
-              <a:defRPr/>
-            </a:pPr>
-            <a:r>
-              <a:rPr lang="en-US" sz="1900" dirty="0"/>
-              <a:t>"Who put the moss in the bog again?" asked Tom repeatedly. </a:t>
-            </a:r>
-          </a:p>
-          <a:p>
-            <a:pPr eaLnBrk="1" hangingPunct="1">
-              <a:spcBef>
-                <a:spcPts val="300"/>
-              </a:spcBef>
-              <a:spcAft>
-                <a:spcPts val="300"/>
-              </a:spcAft>
-              <a:buNone/>
-              <a:defRPr/>
-            </a:pPr>
-            <a:r>
-              <a:rPr lang="en-US" sz="1900" dirty="0"/>
-              <a:t>"A word that contains all five vowels? And I suppose you want those vowels to appear in alphabetical order!?" asked Tom facetiously. </a:t>
-            </a:r>
-          </a:p>
-          <a:p>
-            <a:pPr indent="-284163" eaLnBrk="1" hangingPunct="1">
-              <a:spcBef>
-                <a:spcPts val="300"/>
-              </a:spcBef>
-              <a:spcAft>
-                <a:spcPts val="0"/>
-              </a:spcAft>
-              <a:buNone/>
-              <a:defRPr/>
-            </a:pPr>
-            <a:r>
-              <a:rPr lang="en-US" sz="1900" dirty="0"/>
-              <a:t>"The robber is coming down the stairs", Tom said condescendingly.</a:t>
-            </a:r>
-          </a:p>
-          <a:p>
-            <a:pPr indent="-284163" eaLnBrk="1" hangingPunct="1">
-              <a:spcBef>
-                <a:spcPts val="0"/>
-              </a:spcBef>
-              <a:spcAft>
-                <a:spcPts val="300"/>
-              </a:spcAft>
-              <a:buNone/>
-              <a:defRPr/>
-            </a:pPr>
-            <a:r>
-              <a:rPr lang="en-US" sz="1900" dirty="0"/>
-              <a:t>"</a:t>
-            </a:r>
-            <a:r>
-              <a:rPr lang="en-US" sz="1900" dirty="0" err="1"/>
-              <a:t>Nnnn</a:t>
-            </a:r>
-            <a:r>
-              <a:rPr lang="en-US" sz="1900" dirty="0"/>
-              <a:t>", Tom murmured forensically. </a:t>
-            </a:r>
-          </a:p>
-          <a:p>
-            <a:pPr eaLnBrk="1" hangingPunct="1">
-              <a:buFont typeface="Wingdings" pitchFamily="2" charset="2"/>
-              <a:buNone/>
-              <a:defRPr/>
-            </a:pPr>
-            <a:endParaRPr lang="en-US" sz="1900" dirty="0"/>
-          </a:p>
-        </p:txBody>
-      </p:sp>
-    </p:spTree>
-  </p:cSld>
-  <p:clrMapOvr>
-    <a:masterClrMapping/>
-  </p:clrMapOvr>
-  <p:transition/>
-</p:sld>
-</file>
-
-<file path=ppt/slides/slide8.xml><?xml version="1.0" encoding="utf-8"?>
-<p:sld xmlns:a="http://schemas.openxmlformats.org/drawingml/2006/main" xmlns:r="http://schemas.openxmlformats.org/officeDocument/2006/relationships" xmlns:p="http://schemas.openxmlformats.org/presentationml/2006/main">
-  <p:cSld>
-    <p:spTree>
-      <p:nvGrpSpPr>
-        <p:cNvPr id="1" name=""/>
-        <p:cNvGrpSpPr/>
-        <p:nvPr/>
-      </p:nvGrpSpPr>
-      <p:grpSpPr>
-        <a:xfrm>
-          <a:off x="0" y="0"/>
-          <a:ext cx="0" cy="0"/>
-          <a:chOff x="0" y="0"/>
-          <a:chExt cx="0" cy="0"/>
-        </a:xfrm>
-      </p:grpSpPr>
-      <p:sp>
-        <p:nvSpPr>
-          <p:cNvPr id="304130" name="Rectangle 2"/>
-          <p:cNvSpPr>
-            <a:spLocks noGrp="1" noChangeArrowheads="1"/>
-          </p:cNvSpPr>
-          <p:nvPr>
-            <p:ph type="title"/>
-          </p:nvPr>
-        </p:nvSpPr>
-        <p:spPr>
-          <a:xfrm>
-            <a:off x="381000" y="-152400"/>
-            <a:ext cx="11125200" cy="1139825"/>
-          </a:xfrm>
-        </p:spPr>
-        <p:txBody>
-          <a:bodyPr/>
-          <a:lstStyle/>
-          <a:p>
-            <a:pPr eaLnBrk="1" hangingPunct="1">
-              <a:defRPr/>
-            </a:pPr>
-            <a:r>
-              <a:rPr lang="en-US" dirty="0"/>
-              <a:t>Write these recursive procedures</a:t>
-            </a:r>
-          </a:p>
-        </p:txBody>
-      </p:sp>
-      <p:sp>
-        <p:nvSpPr>
-          <p:cNvPr id="304131" name="Rectangle 3"/>
-          <p:cNvSpPr>
-            <a:spLocks noGrp="1" noChangeArrowheads="1"/>
-          </p:cNvSpPr>
-          <p:nvPr>
-            <p:ph type="body" idx="1"/>
-          </p:nvPr>
-        </p:nvSpPr>
-        <p:spPr>
-          <a:xfrm>
-            <a:off x="838200" y="762001"/>
-            <a:ext cx="10210800" cy="4530725"/>
-          </a:xfrm>
-        </p:spPr>
-        <p:txBody>
-          <a:bodyPr/>
-          <a:lstStyle/>
-          <a:p>
-            <a:pPr eaLnBrk="1" hangingPunct="1">
-              <a:defRPr/>
-            </a:pPr>
-            <a:r>
-              <a:rPr lang="en-US" dirty="0"/>
-              <a:t>Write procedures to </a:t>
-            </a:r>
-          </a:p>
-          <a:p>
-            <a:pPr lvl="1" eaLnBrk="1" hangingPunct="1">
-              <a:defRPr/>
-            </a:pPr>
-            <a:r>
-              <a:rPr lang="en-US" dirty="0"/>
-              <a:t>Find the median of three numbers</a:t>
-            </a:r>
-          </a:p>
-          <a:p>
-            <a:pPr lvl="1" eaLnBrk="1" hangingPunct="1">
-              <a:defRPr/>
-            </a:pPr>
-            <a:r>
-              <a:rPr lang="en-US" dirty="0"/>
-              <a:t>Given a list of numbers </a:t>
-            </a:r>
-            <a:r>
-              <a:rPr lang="en-US" sz="3200" kern="1200" dirty="0" err="1">
-                <a:solidFill>
-                  <a:srgbClr val="FFFF00"/>
-                </a:solidFill>
-                <a:latin typeface="Verdana" pitchFamily="34" charset="0"/>
-                <a:ea typeface="+mn-ea"/>
-                <a:cs typeface="+mn-cs"/>
-              </a:rPr>
-              <a:t>lon</a:t>
-            </a:r>
-            <a:r>
-              <a:rPr lang="en-US" dirty="0"/>
-              <a:t> and a number </a:t>
-            </a:r>
-            <a:r>
-              <a:rPr lang="en-US" sz="3200" kern="1200" dirty="0">
-                <a:solidFill>
-                  <a:srgbClr val="FFFF00"/>
-                </a:solidFill>
-                <a:latin typeface="Verdana" pitchFamily="34" charset="0"/>
-                <a:ea typeface="+mn-ea"/>
-                <a:cs typeface="+mn-cs"/>
-              </a:rPr>
-              <a:t>n</a:t>
-            </a:r>
-            <a:r>
-              <a:rPr lang="en-US" dirty="0"/>
-              <a:t>, return a new list of numbers where each element is </a:t>
-            </a:r>
-            <a:r>
-              <a:rPr lang="en-US" kern="1200" dirty="0">
-                <a:solidFill>
-                  <a:srgbClr val="FFFF00"/>
-                </a:solidFill>
-                <a:latin typeface="Verdana" pitchFamily="34" charset="0"/>
-              </a:rPr>
-              <a:t>n</a:t>
-            </a:r>
-            <a:r>
-              <a:rPr lang="en-US" dirty="0"/>
-              <a:t> more than the corresponding element of </a:t>
-            </a:r>
-            <a:r>
-              <a:rPr lang="en-US" sz="3200" kern="1200" dirty="0" err="1">
-                <a:solidFill>
-                  <a:srgbClr val="FFFF00"/>
-                </a:solidFill>
-                <a:latin typeface="Verdana" pitchFamily="34" charset="0"/>
-                <a:ea typeface="+mn-ea"/>
-                <a:cs typeface="+mn-cs"/>
-              </a:rPr>
-              <a:t>lon</a:t>
-            </a:r>
-            <a:r>
-              <a:rPr lang="en-US" dirty="0"/>
-              <a:t>.</a:t>
-            </a:r>
-          </a:p>
-          <a:p>
-            <a:pPr lvl="1" eaLnBrk="1" hangingPunct="1">
-              <a:defRPr/>
-            </a:pPr>
-            <a:r>
-              <a:rPr lang="en-US" dirty="0"/>
-              <a:t>Count how many times the number </a:t>
-            </a:r>
-            <a:r>
-              <a:rPr lang="en-US" kern="1200" dirty="0">
-                <a:solidFill>
-                  <a:srgbClr val="FFFF00"/>
-                </a:solidFill>
-                <a:latin typeface="Verdana" pitchFamily="34" charset="0"/>
-              </a:rPr>
-              <a:t>n </a:t>
-            </a:r>
-            <a:r>
-              <a:rPr lang="en-US" dirty="0"/>
-              <a:t>occurs in the list </a:t>
-            </a:r>
-            <a:r>
-              <a:rPr lang="en-US" kern="1200" dirty="0" err="1">
-                <a:solidFill>
-                  <a:srgbClr val="FFFF00"/>
-                </a:solidFill>
-                <a:latin typeface="Verdana" pitchFamily="34" charset="0"/>
-              </a:rPr>
-              <a:t>lon</a:t>
-            </a:r>
-            <a:r>
-              <a:rPr lang="en-US" dirty="0"/>
-              <a:t>.</a:t>
-            </a:r>
-          </a:p>
-          <a:p>
-            <a:pPr eaLnBrk="1" hangingPunct="1">
-              <a:defRPr/>
-            </a:pPr>
-            <a:endParaRPr lang="en-US" dirty="0"/>
-          </a:p>
-        </p:txBody>
-      </p:sp>
-      <p:sp>
-        <p:nvSpPr>
-          <p:cNvPr id="13316" name="TextBox 3"/>
-          <p:cNvSpPr txBox="1">
-            <a:spLocks noChangeArrowheads="1"/>
-          </p:cNvSpPr>
-          <p:nvPr/>
-        </p:nvSpPr>
-        <p:spPr bwMode="auto">
-          <a:xfrm>
-            <a:off x="2819400" y="5791201"/>
-            <a:ext cx="7543800" cy="1138773"/>
-          </a:xfrm>
-          <a:prstGeom prst="rect">
-            <a:avLst/>
-          </a:prstGeom>
-          <a:noFill/>
-          <a:ln w="9525">
-            <a:noFill/>
-            <a:miter lim="800000"/>
-            <a:headEnd/>
-            <a:tailEnd/>
-          </a:ln>
-        </p:spPr>
-        <p:txBody>
-          <a:bodyPr wrap="square">
-            <a:spAutoFit/>
-          </a:bodyPr>
-          <a:lstStyle/>
-          <a:p>
-            <a:pPr>
-              <a:buFont typeface="Arial" charset="0"/>
-              <a:buChar char="•"/>
-            </a:pPr>
-            <a:r>
-              <a:rPr lang="en-US" sz="2800" dirty="0">
-                <a:effectLst>
-                  <a:outerShdw blurRad="38100" dist="38100" dir="2700000" algn="tl">
-                    <a:srgbClr val="000000"/>
-                  </a:outerShdw>
-                </a:effectLst>
-                <a:latin typeface="+mn-lt"/>
-              </a:rPr>
-              <a:t> </a:t>
-            </a:r>
-            <a:r>
-              <a:rPr lang="en-US" sz="3600" dirty="0">
-                <a:effectLst>
-                  <a:outerShdw blurRad="38100" dist="38100" dir="2700000" algn="tl">
-                    <a:srgbClr val="000000"/>
-                  </a:outerShdw>
-                </a:effectLst>
-                <a:latin typeface="+mn-lt"/>
-              </a:rPr>
-              <a:t>* </a:t>
-            </a:r>
-            <a:r>
-              <a:rPr lang="en-US" sz="3200" dirty="0">
-                <a:solidFill>
-                  <a:srgbClr val="FFFF00"/>
-                </a:solidFill>
-              </a:rPr>
-              <a:t>"…if any time remains," </a:t>
-            </a:r>
-            <a:br>
-              <a:rPr lang="en-US" sz="3200" dirty="0">
-                <a:solidFill>
-                  <a:srgbClr val="FFFF00"/>
-                </a:solidFill>
-              </a:rPr>
-            </a:br>
-            <a:r>
-              <a:rPr lang="en-US" sz="3200" dirty="0">
-                <a:solidFill>
-                  <a:srgbClr val="FFFF00"/>
-                </a:solidFill>
-              </a:rPr>
-              <a:t>        Tom schemed parenthetically.</a:t>
-            </a:r>
-            <a:r>
-              <a:rPr lang="en-US" sz="3200" dirty="0"/>
-              <a:t> </a:t>
-            </a:r>
-          </a:p>
-        </p:txBody>
-      </p:sp>
-    </p:spTree>
-    <p:extLst>
-      <p:ext uri="{BB962C8B-B14F-4D97-AF65-F5344CB8AC3E}">
-        <p14:creationId xmlns:p14="http://schemas.microsoft.com/office/powerpoint/2010/main" val="1424549170"/>
-      </p:ext>
-    </p:extLst>
-  </p:cSld>
-  <p:clrMapOvr>
-    <a:masterClrMapping/>
-  </p:clrMapOvr>
-</p:sld>
-</file>
-
-<file path=ppt/slides/slide9.xml><?xml version="1.0" encoding="utf-8"?>
+<file path=ppt/slides/slide10.xml><?xml version="1.0" encoding="utf-8"?>
 <p:sld xmlns:a="http://schemas.openxmlformats.org/drawingml/2006/main" xmlns:r="http://schemas.openxmlformats.org/officeDocument/2006/relationships" xmlns:p="http://schemas.openxmlformats.org/presentationml/2006/main">
   <p:cSld>
     <p:spTree>
@@ -17623,7 +16569,7 @@
                   <a:srgbClr val="FFFF00"/>
                 </a:solidFill>
               </a:rPr>
-              <a:t>Go to your assigned breakout room.</a:t>
+              <a:t>Work with the students sitting next to you</a:t>
             </a:r>
           </a:p>
           <a:p>
@@ -17932,6 +16878,2070 @@
       <p:bldP spid="318467" grpId="0" build="p"/>
     </p:bldLst>
   </p:timing>
+</p:sld>
+</file>
+
+<file path=ppt/slides/slide2.xml><?xml version="1.0" encoding="utf-8"?>
+<p:sld xmlns:a="http://schemas.openxmlformats.org/drawingml/2006/main" xmlns:r="http://schemas.openxmlformats.org/officeDocument/2006/relationships" xmlns:p="http://schemas.openxmlformats.org/presentationml/2006/main">
+  <p:cSld>
+    <p:spTree>
+      <p:nvGrpSpPr>
+        <p:cNvPr id="1" name=""/>
+        <p:cNvGrpSpPr/>
+        <p:nvPr/>
+      </p:nvGrpSpPr>
+      <p:grpSpPr>
+        <a:xfrm>
+          <a:off x="0" y="0"/>
+          <a:ext cx="0" cy="0"/>
+          <a:chOff x="0" y="0"/>
+          <a:chExt cx="0" cy="0"/>
+        </a:xfrm>
+      </p:grpSpPr>
+      <p:sp>
+        <p:nvSpPr>
+          <p:cNvPr id="2" name="Title 1">
+            <a:extLst>
+              <a:ext uri="{FF2B5EF4-FFF2-40B4-BE49-F238E27FC236}">
+                <a16:creationId xmlns:a16="http://schemas.microsoft.com/office/drawing/2014/main" id="{A8B517EA-78A1-49F4-A495-5150B9F0D117}"/>
+              </a:ext>
+            </a:extLst>
+          </p:cNvPr>
+          <p:cNvSpPr>
+            <a:spLocks noGrp="1"/>
+          </p:cNvSpPr>
+          <p:nvPr>
+            <p:ph type="title"/>
+          </p:nvPr>
+        </p:nvSpPr>
+        <p:spPr/>
+        <p:txBody>
+          <a:bodyPr/>
+          <a:lstStyle/>
+          <a:p>
+            <a:r>
+              <a:rPr lang="en-US" dirty="0"/>
+              <a:t>Finding today’s starting code</a:t>
+            </a:r>
+          </a:p>
+        </p:txBody>
+      </p:sp>
+      <p:sp>
+        <p:nvSpPr>
+          <p:cNvPr id="3" name="Content Placeholder 2">
+            <a:extLst>
+              <a:ext uri="{FF2B5EF4-FFF2-40B4-BE49-F238E27FC236}">
+                <a16:creationId xmlns:a16="http://schemas.microsoft.com/office/drawing/2014/main" id="{20358E11-049B-40D2-82DB-949F2568C944}"/>
+              </a:ext>
+            </a:extLst>
+          </p:cNvPr>
+          <p:cNvSpPr>
+            <a:spLocks noGrp="1"/>
+          </p:cNvSpPr>
+          <p:nvPr>
+            <p:ph idx="1"/>
+          </p:nvPr>
+        </p:nvSpPr>
+        <p:spPr>
+          <a:xfrm>
+            <a:off x="152400" y="1600201"/>
+            <a:ext cx="11887200" cy="4530725"/>
+          </a:xfrm>
+        </p:spPr>
+        <p:txBody>
+          <a:bodyPr/>
+          <a:lstStyle/>
+          <a:p>
+            <a:pPr marL="514350" indent="-514350">
+              <a:buFont typeface="+mj-lt"/>
+              <a:buAutoNum type="arabicPeriod"/>
+            </a:pPr>
+            <a:r>
+              <a:rPr lang="en-US" dirty="0"/>
+              <a:t>Course repo - </a:t>
+            </a:r>
+            <a:r>
+              <a:rPr lang="en-US" dirty="0" err="1"/>
+              <a:t>ClassMaterials</a:t>
+            </a:r>
+            <a:r>
+              <a:rPr lang="en-US" dirty="0"/>
+              <a:t>/Lambda/</a:t>
+            </a:r>
+            <a:r>
+              <a:rPr lang="en-US" dirty="0" err="1"/>
+              <a:t>startingcode.ss</a:t>
+            </a:r>
+            <a:endParaRPr lang="en-US" dirty="0"/>
+          </a:p>
+          <a:p>
+            <a:pPr marL="514350" indent="-514350">
+              <a:buFont typeface="+mj-lt"/>
+              <a:buAutoNum type="arabicPeriod"/>
+            </a:pPr>
+            <a:r>
+              <a:rPr lang="en-US" dirty="0"/>
+              <a:t>If I didn’t tell you today’s class was called lambda, you could see it on the schedule page</a:t>
+            </a:r>
+          </a:p>
+          <a:p>
+            <a:pPr marL="514350" indent="-514350">
+              <a:buFont typeface="+mj-lt"/>
+              <a:buAutoNum type="arabicPeriod"/>
+            </a:pPr>
+            <a:r>
+              <a:rPr lang="en-US" dirty="0"/>
+              <a:t>You need to “git pull” because I pushed it earlier today (that’s usual)</a:t>
+            </a:r>
+          </a:p>
+          <a:p>
+            <a:pPr marL="514350" indent="-514350">
+              <a:buFont typeface="+mj-lt"/>
+              <a:buAutoNum type="arabicPeriod"/>
+            </a:pPr>
+            <a:r>
+              <a:rPr lang="en-US" dirty="0"/>
+              <a:t>The starting code errors if you load it, but don’t worry…</a:t>
+            </a:r>
+          </a:p>
+          <a:p>
+            <a:pPr marL="514350" indent="-514350">
+              <a:buFont typeface="+mj-lt"/>
+              <a:buAutoNum type="arabicPeriod"/>
+            </a:pPr>
+            <a:endParaRPr lang="en-US" dirty="0"/>
+          </a:p>
+        </p:txBody>
+      </p:sp>
+    </p:spTree>
+    <p:extLst>
+      <p:ext uri="{BB962C8B-B14F-4D97-AF65-F5344CB8AC3E}">
+        <p14:creationId xmlns:p14="http://schemas.microsoft.com/office/powerpoint/2010/main" val="2879101978"/>
+      </p:ext>
+    </p:extLst>
+  </p:cSld>
+  <p:clrMapOvr>
+    <a:masterClrMapping/>
+  </p:clrMapOvr>
+</p:sld>
+</file>
+
+<file path=ppt/slides/slide3.xml><?xml version="1.0" encoding="utf-8"?>
+<p:sld xmlns:a="http://schemas.openxmlformats.org/drawingml/2006/main" xmlns:r="http://schemas.openxmlformats.org/officeDocument/2006/relationships" xmlns:p="http://schemas.openxmlformats.org/presentationml/2006/main">
+  <p:cSld>
+    <p:spTree>
+      <p:nvGrpSpPr>
+        <p:cNvPr id="1" name=""/>
+        <p:cNvGrpSpPr/>
+        <p:nvPr/>
+      </p:nvGrpSpPr>
+      <p:grpSpPr>
+        <a:xfrm>
+          <a:off x="0" y="0"/>
+          <a:ext cx="0" cy="0"/>
+          <a:chOff x="0" y="0"/>
+          <a:chExt cx="0" cy="0"/>
+        </a:xfrm>
+      </p:grpSpPr>
+      <p:sp>
+        <p:nvSpPr>
+          <p:cNvPr id="293890" name="Rectangle 2"/>
+          <p:cNvSpPr>
+            <a:spLocks noGrp="1" noChangeArrowheads="1"/>
+          </p:cNvSpPr>
+          <p:nvPr>
+            <p:ph type="title"/>
+          </p:nvPr>
+        </p:nvSpPr>
+        <p:spPr>
+          <a:xfrm>
+            <a:off x="1981200" y="76201"/>
+            <a:ext cx="8229600" cy="1139825"/>
+          </a:xfrm>
+        </p:spPr>
+        <p:txBody>
+          <a:bodyPr/>
+          <a:lstStyle/>
+          <a:p>
+            <a:pPr eaLnBrk="1" hangingPunct="1">
+              <a:defRPr/>
+            </a:pPr>
+            <a:r>
+              <a:rPr lang="en-US" dirty="0"/>
+              <a:t>Day 2 things to do</a:t>
+            </a:r>
+          </a:p>
+        </p:txBody>
+      </p:sp>
+      <p:sp>
+        <p:nvSpPr>
+          <p:cNvPr id="293891" name="Rectangle 3"/>
+          <p:cNvSpPr>
+            <a:spLocks noGrp="1" noChangeArrowheads="1"/>
+          </p:cNvSpPr>
+          <p:nvPr>
+            <p:ph type="body" idx="1"/>
+          </p:nvPr>
+        </p:nvSpPr>
+        <p:spPr>
+          <a:xfrm>
+            <a:off x="762000" y="1143000"/>
+            <a:ext cx="10439400" cy="4419600"/>
+          </a:xfrm>
+        </p:spPr>
+        <p:txBody>
+          <a:bodyPr/>
+          <a:lstStyle/>
+          <a:p>
+            <a:pPr eaLnBrk="1" hangingPunct="1">
+              <a:defRPr/>
+            </a:pPr>
+            <a:r>
+              <a:rPr lang="en-US" sz="2800" dirty="0"/>
+              <a:t>Your non-Scheme questions </a:t>
+            </a:r>
+          </a:p>
+          <a:p>
+            <a:pPr eaLnBrk="1" hangingPunct="1">
+              <a:defRPr/>
+            </a:pPr>
+            <a:r>
+              <a:rPr lang="en-US" sz="2800" dirty="0"/>
+              <a:t>Your Scheme Questions</a:t>
+            </a:r>
+          </a:p>
+          <a:p>
+            <a:pPr eaLnBrk="1" hangingPunct="1">
+              <a:defRPr/>
+            </a:pPr>
+            <a:r>
+              <a:rPr lang="en-US" sz="2800" dirty="0"/>
+              <a:t>Run the A1 offline  test code</a:t>
+            </a:r>
+          </a:p>
+          <a:p>
+            <a:pPr eaLnBrk="1" hangingPunct="1">
+              <a:defRPr/>
+            </a:pPr>
+            <a:r>
+              <a:rPr lang="en-US" sz="2800" dirty="0"/>
+              <a:t>More recursive procedures (together)</a:t>
+            </a:r>
+          </a:p>
+          <a:p>
+            <a:pPr eaLnBrk="1" hangingPunct="1">
+              <a:defRPr/>
+            </a:pPr>
+            <a:r>
+              <a:rPr lang="en-US" sz="2800" dirty="0"/>
+              <a:t>Still more recursive procedures (in breakout rooms)</a:t>
+            </a:r>
+          </a:p>
+          <a:p>
+            <a:pPr eaLnBrk="1" hangingPunct="1">
+              <a:defRPr/>
+            </a:pPr>
+            <a:endParaRPr lang="en-US" sz="2800" dirty="0"/>
+          </a:p>
+          <a:p>
+            <a:pPr eaLnBrk="1" hangingPunct="1">
+              <a:defRPr/>
+            </a:pPr>
+            <a:endParaRPr lang="en-US" sz="2800" dirty="0"/>
+          </a:p>
+        </p:txBody>
+      </p:sp>
+    </p:spTree>
+  </p:cSld>
+  <p:clrMapOvr>
+    <a:masterClrMapping/>
+  </p:clrMapOvr>
+</p:sld>
+</file>
+
+<file path=ppt/slides/slide4.xml><?xml version="1.0" encoding="utf-8"?>
+<p:sld xmlns:a="http://schemas.openxmlformats.org/drawingml/2006/main" xmlns:r="http://schemas.openxmlformats.org/officeDocument/2006/relationships" xmlns:p="http://schemas.openxmlformats.org/presentationml/2006/main">
+  <p:cSld>
+    <p:spTree>
+      <p:nvGrpSpPr>
+        <p:cNvPr id="1" name=""/>
+        <p:cNvGrpSpPr/>
+        <p:nvPr/>
+      </p:nvGrpSpPr>
+      <p:grpSpPr>
+        <a:xfrm>
+          <a:off x="0" y="0"/>
+          <a:ext cx="0" cy="0"/>
+          <a:chOff x="0" y="0"/>
+          <a:chExt cx="0" cy="0"/>
+        </a:xfrm>
+      </p:grpSpPr>
+      <p:sp>
+        <p:nvSpPr>
+          <p:cNvPr id="87042" name="Rectangle 2"/>
+          <p:cNvSpPr>
+            <a:spLocks noGrp="1" noChangeArrowheads="1"/>
+          </p:cNvSpPr>
+          <p:nvPr>
+            <p:ph type="title"/>
+          </p:nvPr>
+        </p:nvSpPr>
+        <p:spPr>
+          <a:xfrm>
+            <a:off x="1981200" y="155576"/>
+            <a:ext cx="8229600" cy="1139825"/>
+          </a:xfrm>
+        </p:spPr>
+        <p:txBody>
+          <a:bodyPr/>
+          <a:lstStyle/>
+          <a:p>
+            <a:r>
+              <a:rPr lang="en-US" dirty="0"/>
+              <a:t>Students Questions</a:t>
+            </a:r>
+          </a:p>
+        </p:txBody>
+      </p:sp>
+      <p:sp>
+        <p:nvSpPr>
+          <p:cNvPr id="87043" name="Rectangle 3"/>
+          <p:cNvSpPr>
+            <a:spLocks noGrp="1" noChangeArrowheads="1"/>
+          </p:cNvSpPr>
+          <p:nvPr>
+            <p:ph type="body" idx="1"/>
+          </p:nvPr>
+        </p:nvSpPr>
+        <p:spPr>
+          <a:xfrm>
+            <a:off x="990600" y="1717675"/>
+            <a:ext cx="10363200" cy="4530725"/>
+          </a:xfrm>
+        </p:spPr>
+        <p:txBody>
+          <a:bodyPr/>
+          <a:lstStyle/>
+          <a:p>
+            <a:r>
+              <a:rPr lang="en-US" dirty="0"/>
+              <a:t>Questions about the syllabus or course policies?</a:t>
+            </a:r>
+          </a:p>
+          <a:p>
+            <a:endParaRPr lang="en-US" dirty="0"/>
+          </a:p>
+          <a:p>
+            <a:r>
+              <a:rPr lang="en-US" dirty="0"/>
+              <a:t>Questions about installation, tool use, etc.?</a:t>
+            </a:r>
+            <a:br>
+              <a:rPr lang="en-US" dirty="0"/>
+            </a:br>
+            <a:endParaRPr lang="en-US" dirty="0"/>
+          </a:p>
+          <a:p>
+            <a:r>
+              <a:rPr lang="en-US" dirty="0"/>
+              <a:t>Questions about Scheme?</a:t>
+            </a:r>
+            <a:br>
+              <a:rPr lang="en-US" dirty="0"/>
+            </a:br>
+            <a:endParaRPr lang="en-US" dirty="0"/>
+          </a:p>
+          <a:p>
+            <a:endParaRPr lang="en-US" dirty="0"/>
+          </a:p>
+        </p:txBody>
+      </p:sp>
+    </p:spTree>
+    <p:extLst>
+      <p:ext uri="{BB962C8B-B14F-4D97-AF65-F5344CB8AC3E}">
+        <p14:creationId xmlns:p14="http://schemas.microsoft.com/office/powerpoint/2010/main" val="1059650853"/>
+      </p:ext>
+    </p:extLst>
+  </p:cSld>
+  <p:clrMapOvr>
+    <a:masterClrMapping/>
+  </p:clrMapOvr>
+</p:sld>
+</file>
+
+<file path=ppt/slides/slide5.xml><?xml version="1.0" encoding="utf-8"?>
+<p:sld xmlns:a="http://schemas.openxmlformats.org/drawingml/2006/main" xmlns:r="http://schemas.openxmlformats.org/officeDocument/2006/relationships" xmlns:p="http://schemas.openxmlformats.org/presentationml/2006/main">
+  <p:cSld>
+    <p:spTree>
+      <p:nvGrpSpPr>
+        <p:cNvPr id="1" name=""/>
+        <p:cNvGrpSpPr/>
+        <p:nvPr/>
+      </p:nvGrpSpPr>
+      <p:grpSpPr>
+        <a:xfrm>
+          <a:off x="0" y="0"/>
+          <a:ext cx="0" cy="0"/>
+          <a:chOff x="0" y="0"/>
+          <a:chExt cx="0" cy="0"/>
+        </a:xfrm>
+      </p:grpSpPr>
+      <p:sp>
+        <p:nvSpPr>
+          <p:cNvPr id="92162" name="Rectangle 2"/>
+          <p:cNvSpPr>
+            <a:spLocks noGrp="1" noChangeArrowheads="1"/>
+          </p:cNvSpPr>
+          <p:nvPr>
+            <p:ph type="title"/>
+          </p:nvPr>
+        </p:nvSpPr>
+        <p:spPr/>
+        <p:txBody>
+          <a:bodyPr/>
+          <a:lstStyle/>
+          <a:p>
+            <a:r>
+              <a:rPr lang="en-US" dirty="0"/>
+              <a:t>Running my test code on your own computer</a:t>
+            </a:r>
+          </a:p>
+        </p:txBody>
+      </p:sp>
+      <p:sp>
+        <p:nvSpPr>
+          <p:cNvPr id="92163" name="Rectangle 3"/>
+          <p:cNvSpPr>
+            <a:spLocks noGrp="1" noChangeArrowheads="1"/>
+          </p:cNvSpPr>
+          <p:nvPr>
+            <p:ph type="body" idx="1"/>
+          </p:nvPr>
+        </p:nvSpPr>
+        <p:spPr/>
+        <p:txBody>
+          <a:bodyPr/>
+          <a:lstStyle/>
+          <a:p>
+            <a:r>
+              <a:rPr lang="en-US" dirty="0"/>
+              <a:t>I will demonstrate this in Visual Studio Code</a:t>
+            </a:r>
+          </a:p>
+        </p:txBody>
+      </p:sp>
+    </p:spTree>
+    <p:extLst>
+      <p:ext uri="{BB962C8B-B14F-4D97-AF65-F5344CB8AC3E}">
+        <p14:creationId xmlns:p14="http://schemas.microsoft.com/office/powerpoint/2010/main" val="136193430"/>
+      </p:ext>
+    </p:extLst>
+  </p:cSld>
+  <p:clrMapOvr>
+    <a:masterClrMapping/>
+  </p:clrMapOvr>
+</p:sld>
+</file>
+
+<file path=ppt/slides/slide6.xml><?xml version="1.0" encoding="utf-8"?>
+<p:sld xmlns:a="http://schemas.openxmlformats.org/drawingml/2006/main" xmlns:r="http://schemas.openxmlformats.org/officeDocument/2006/relationships" xmlns:p="http://schemas.openxmlformats.org/presentationml/2006/main">
+  <p:cSld>
+    <p:spTree>
+      <p:nvGrpSpPr>
+        <p:cNvPr id="1" name=""/>
+        <p:cNvGrpSpPr/>
+        <p:nvPr/>
+      </p:nvGrpSpPr>
+      <p:grpSpPr>
+        <a:xfrm>
+          <a:off x="0" y="0"/>
+          <a:ext cx="0" cy="0"/>
+          <a:chOff x="0" y="0"/>
+          <a:chExt cx="0" cy="0"/>
+        </a:xfrm>
+      </p:grpSpPr>
+      <p:sp>
+        <p:nvSpPr>
+          <p:cNvPr id="2" name="Title 1">
+            <a:extLst>
+              <a:ext uri="{FF2B5EF4-FFF2-40B4-BE49-F238E27FC236}">
+                <a16:creationId xmlns:a16="http://schemas.microsoft.com/office/drawing/2014/main" id="{1872CA25-BAC8-45A0-B8BD-F8BAC92EFF1B}"/>
+              </a:ext>
+            </a:extLst>
+          </p:cNvPr>
+          <p:cNvSpPr>
+            <a:spLocks noGrp="1"/>
+          </p:cNvSpPr>
+          <p:nvPr>
+            <p:ph type="title"/>
+          </p:nvPr>
+        </p:nvSpPr>
+        <p:spPr/>
+        <p:txBody>
+          <a:bodyPr/>
+          <a:lstStyle/>
+          <a:p>
+            <a:r>
+              <a:rPr lang="en-US" dirty="0"/>
+              <a:t>Interlude</a:t>
+            </a:r>
+          </a:p>
+        </p:txBody>
+      </p:sp>
+      <p:pic>
+        <p:nvPicPr>
+          <p:cNvPr id="5" name="Content Placeholder 4" descr="A close up of text on a black background&#10;&#10;Description generated with high confidence">
+            <a:extLst>
+              <a:ext uri="{FF2B5EF4-FFF2-40B4-BE49-F238E27FC236}">
+                <a16:creationId xmlns:a16="http://schemas.microsoft.com/office/drawing/2014/main" id="{1AFC7C03-5A7D-46B0-8647-2CB6B3E82697}"/>
+              </a:ext>
+            </a:extLst>
+          </p:cNvPr>
+          <p:cNvPicPr>
+            <a:picLocks noGrp="1" noChangeAspect="1"/>
+          </p:cNvPicPr>
+          <p:nvPr>
+            <p:ph idx="1"/>
+          </p:nvPr>
+        </p:nvPicPr>
+        <p:blipFill>
+          <a:blip r:embed="rId2">
+            <a:extLst>
+              <a:ext uri="{28A0092B-C50C-407E-A947-70E740481C1C}">
+                <a14:useLocalDpi xmlns:a14="http://schemas.microsoft.com/office/drawing/2010/main" val="0"/>
+              </a:ext>
+            </a:extLst>
+          </a:blip>
+          <a:stretch>
+            <a:fillRect/>
+          </a:stretch>
+        </p:blipFill>
+        <p:spPr>
+          <a:xfrm>
+            <a:off x="1676400" y="1837376"/>
+            <a:ext cx="8839200" cy="3183248"/>
+          </a:xfrm>
+        </p:spPr>
+      </p:pic>
+    </p:spTree>
+    <p:extLst>
+      <p:ext uri="{BB962C8B-B14F-4D97-AF65-F5344CB8AC3E}">
+        <p14:creationId xmlns:p14="http://schemas.microsoft.com/office/powerpoint/2010/main" val="2171581171"/>
+      </p:ext>
+    </p:extLst>
+  </p:cSld>
+  <p:clrMapOvr>
+    <a:masterClrMapping/>
+  </p:clrMapOvr>
+</p:sld>
+</file>
+
+<file path=ppt/slides/slide7.xml><?xml version="1.0" encoding="utf-8"?>
+<p:sld xmlns:a="http://schemas.openxmlformats.org/drawingml/2006/main" xmlns:r="http://schemas.openxmlformats.org/officeDocument/2006/relationships" xmlns:p="http://schemas.openxmlformats.org/presentationml/2006/main">
+  <p:cSld>
+    <p:spTree>
+      <p:nvGrpSpPr>
+        <p:cNvPr id="1" name=""/>
+        <p:cNvGrpSpPr/>
+        <p:nvPr/>
+      </p:nvGrpSpPr>
+      <p:grpSpPr>
+        <a:xfrm>
+          <a:off x="0" y="0"/>
+          <a:ext cx="0" cy="0"/>
+          <a:chOff x="0" y="0"/>
+          <a:chExt cx="0" cy="0"/>
+        </a:xfrm>
+      </p:grpSpPr>
+      <p:sp>
+        <p:nvSpPr>
+          <p:cNvPr id="304130" name="Rectangle 2"/>
+          <p:cNvSpPr>
+            <a:spLocks noGrp="1" noChangeArrowheads="1"/>
+          </p:cNvSpPr>
+          <p:nvPr>
+            <p:ph type="title"/>
+          </p:nvPr>
+        </p:nvSpPr>
+        <p:spPr>
+          <a:xfrm>
+            <a:off x="381000" y="-152400"/>
+            <a:ext cx="11125200" cy="1139825"/>
+          </a:xfrm>
+        </p:spPr>
+        <p:txBody>
+          <a:bodyPr/>
+          <a:lstStyle/>
+          <a:p>
+            <a:pPr eaLnBrk="1" hangingPunct="1">
+              <a:defRPr/>
+            </a:pPr>
+            <a:r>
+              <a:rPr lang="en-US" dirty="0"/>
+              <a:t>I’ll write these procedures</a:t>
+            </a:r>
+          </a:p>
+        </p:txBody>
+      </p:sp>
+      <p:sp>
+        <p:nvSpPr>
+          <p:cNvPr id="304131" name="Rectangle 3"/>
+          <p:cNvSpPr>
+            <a:spLocks noGrp="1" noChangeArrowheads="1"/>
+          </p:cNvSpPr>
+          <p:nvPr>
+            <p:ph type="body" idx="1"/>
+          </p:nvPr>
+        </p:nvSpPr>
+        <p:spPr>
+          <a:xfrm>
+            <a:off x="838200" y="762001"/>
+            <a:ext cx="10210800" cy="4530725"/>
+          </a:xfrm>
+        </p:spPr>
+        <p:txBody>
+          <a:bodyPr/>
+          <a:lstStyle/>
+          <a:p>
+            <a:pPr eaLnBrk="1" hangingPunct="1">
+              <a:defRPr/>
+            </a:pPr>
+            <a:r>
+              <a:rPr lang="en-US" dirty="0"/>
+              <a:t>Write procedures to </a:t>
+            </a:r>
+          </a:p>
+          <a:p>
+            <a:pPr lvl="1" eaLnBrk="1" hangingPunct="1">
+              <a:defRPr/>
+            </a:pPr>
+            <a:r>
+              <a:rPr lang="en-US" dirty="0"/>
+              <a:t>Find the median of three numbers</a:t>
+            </a:r>
+          </a:p>
+          <a:p>
+            <a:pPr lvl="1" eaLnBrk="1" hangingPunct="1">
+              <a:defRPr/>
+            </a:pPr>
+            <a:r>
+              <a:rPr lang="en-US" dirty="0"/>
+              <a:t>Given a list of numbers </a:t>
+            </a:r>
+            <a:r>
+              <a:rPr lang="en-US" sz="3200" kern="1200" dirty="0" err="1">
+                <a:solidFill>
+                  <a:srgbClr val="FFFF00"/>
+                </a:solidFill>
+                <a:latin typeface="Verdana" pitchFamily="34" charset="0"/>
+                <a:ea typeface="+mn-ea"/>
+                <a:cs typeface="+mn-cs"/>
+              </a:rPr>
+              <a:t>lon</a:t>
+            </a:r>
+            <a:r>
+              <a:rPr lang="en-US" dirty="0"/>
+              <a:t> and a number </a:t>
+            </a:r>
+            <a:r>
+              <a:rPr lang="en-US" sz="3200" kern="1200" dirty="0">
+                <a:solidFill>
+                  <a:srgbClr val="FFFF00"/>
+                </a:solidFill>
+                <a:latin typeface="Verdana" pitchFamily="34" charset="0"/>
+                <a:ea typeface="+mn-ea"/>
+                <a:cs typeface="+mn-cs"/>
+              </a:rPr>
+              <a:t>n</a:t>
+            </a:r>
+            <a:r>
+              <a:rPr lang="en-US" dirty="0"/>
+              <a:t>, return a new list of numbers where each element is </a:t>
+            </a:r>
+            <a:r>
+              <a:rPr lang="en-US" kern="1200" dirty="0">
+                <a:solidFill>
+                  <a:srgbClr val="FFFF00"/>
+                </a:solidFill>
+                <a:latin typeface="Verdana" pitchFamily="34" charset="0"/>
+              </a:rPr>
+              <a:t>n</a:t>
+            </a:r>
+            <a:r>
+              <a:rPr lang="en-US" dirty="0"/>
+              <a:t> more than the corresponding element of </a:t>
+            </a:r>
+            <a:r>
+              <a:rPr lang="en-US" sz="3200" kern="1200" dirty="0" err="1">
+                <a:solidFill>
+                  <a:srgbClr val="FFFF00"/>
+                </a:solidFill>
+                <a:latin typeface="Verdana" pitchFamily="34" charset="0"/>
+                <a:ea typeface="+mn-ea"/>
+                <a:cs typeface="+mn-cs"/>
+              </a:rPr>
+              <a:t>lon</a:t>
+            </a:r>
+            <a:r>
+              <a:rPr lang="en-US" dirty="0"/>
+              <a:t>.</a:t>
+            </a:r>
+          </a:p>
+          <a:p>
+            <a:pPr lvl="1" eaLnBrk="1" hangingPunct="1">
+              <a:defRPr/>
+            </a:pPr>
+            <a:r>
+              <a:rPr lang="en-US" dirty="0"/>
+              <a:t>Count how many times the number </a:t>
+            </a:r>
+            <a:r>
+              <a:rPr lang="en-US" kern="1200" dirty="0">
+                <a:solidFill>
+                  <a:srgbClr val="FFFF00"/>
+                </a:solidFill>
+                <a:latin typeface="Verdana" pitchFamily="34" charset="0"/>
+              </a:rPr>
+              <a:t>n </a:t>
+            </a:r>
+            <a:r>
+              <a:rPr lang="en-US" dirty="0"/>
+              <a:t>occurs in the list </a:t>
+            </a:r>
+            <a:r>
+              <a:rPr lang="en-US" kern="1200" dirty="0" err="1">
+                <a:solidFill>
+                  <a:srgbClr val="FFFF00"/>
+                </a:solidFill>
+                <a:latin typeface="Verdana" pitchFamily="34" charset="0"/>
+              </a:rPr>
+              <a:t>lon</a:t>
+            </a:r>
+            <a:r>
+              <a:rPr lang="en-US" dirty="0"/>
+              <a:t>.</a:t>
+            </a:r>
+          </a:p>
+          <a:p>
+            <a:pPr eaLnBrk="1" hangingPunct="1">
+              <a:defRPr/>
+            </a:pPr>
+            <a:endParaRPr lang="en-US" dirty="0"/>
+          </a:p>
+        </p:txBody>
+      </p:sp>
+      <p:sp>
+        <p:nvSpPr>
+          <p:cNvPr id="13316" name="TextBox 3"/>
+          <p:cNvSpPr txBox="1">
+            <a:spLocks noChangeArrowheads="1"/>
+          </p:cNvSpPr>
+          <p:nvPr/>
+        </p:nvSpPr>
+        <p:spPr bwMode="auto">
+          <a:xfrm>
+            <a:off x="2819400" y="5791201"/>
+            <a:ext cx="7543800" cy="1138773"/>
+          </a:xfrm>
+          <a:prstGeom prst="rect">
+            <a:avLst/>
+          </a:prstGeom>
+          <a:noFill/>
+          <a:ln w="9525">
+            <a:noFill/>
+            <a:miter lim="800000"/>
+            <a:headEnd/>
+            <a:tailEnd/>
+          </a:ln>
+        </p:spPr>
+        <p:txBody>
+          <a:bodyPr wrap="square">
+            <a:spAutoFit/>
+          </a:bodyPr>
+          <a:lstStyle/>
+          <a:p>
+            <a:pPr>
+              <a:buFont typeface="Arial" charset="0"/>
+              <a:buChar char="•"/>
+            </a:pPr>
+            <a:r>
+              <a:rPr lang="en-US" sz="2800" dirty="0">
+                <a:effectLst>
+                  <a:outerShdw blurRad="38100" dist="38100" dir="2700000" algn="tl">
+                    <a:srgbClr val="000000"/>
+                  </a:outerShdw>
+                </a:effectLst>
+                <a:latin typeface="+mn-lt"/>
+              </a:rPr>
+              <a:t> </a:t>
+            </a:r>
+            <a:r>
+              <a:rPr lang="en-US" sz="3600" dirty="0">
+                <a:effectLst>
+                  <a:outerShdw blurRad="38100" dist="38100" dir="2700000" algn="tl">
+                    <a:srgbClr val="000000"/>
+                  </a:outerShdw>
+                </a:effectLst>
+                <a:latin typeface="+mn-lt"/>
+              </a:rPr>
+              <a:t>* </a:t>
+            </a:r>
+            <a:r>
+              <a:rPr lang="en-US" sz="3200" dirty="0">
+                <a:solidFill>
+                  <a:srgbClr val="FFFF00"/>
+                </a:solidFill>
+              </a:rPr>
+              <a:t>"…if any time remains," </a:t>
+            </a:r>
+            <a:br>
+              <a:rPr lang="en-US" sz="3200" dirty="0">
+                <a:solidFill>
+                  <a:srgbClr val="FFFF00"/>
+                </a:solidFill>
+              </a:rPr>
+            </a:br>
+            <a:r>
+              <a:rPr lang="en-US" sz="3200" dirty="0">
+                <a:solidFill>
+                  <a:srgbClr val="FFFF00"/>
+                </a:solidFill>
+              </a:rPr>
+              <a:t>        Tom schemed parenthetically.</a:t>
+            </a:r>
+            <a:r>
+              <a:rPr lang="en-US" sz="3200" dirty="0"/>
+              <a:t> </a:t>
+            </a:r>
+          </a:p>
+        </p:txBody>
+      </p:sp>
+    </p:spTree>
+    <p:extLst>
+      <p:ext uri="{BB962C8B-B14F-4D97-AF65-F5344CB8AC3E}">
+        <p14:creationId xmlns:p14="http://schemas.microsoft.com/office/powerpoint/2010/main" val="1424549170"/>
+      </p:ext>
+    </p:extLst>
+  </p:cSld>
+  <p:clrMapOvr>
+    <a:masterClrMapping/>
+  </p:clrMapOvr>
+</p:sld>
+</file>
+
+<file path=ppt/slides/slide8.xml><?xml version="1.0" encoding="utf-8"?>
+<p:sld xmlns:a="http://schemas.openxmlformats.org/drawingml/2006/main" xmlns:r="http://schemas.openxmlformats.org/officeDocument/2006/relationships" xmlns:p="http://schemas.openxmlformats.org/presentationml/2006/main">
+  <p:cSld>
+    <p:spTree>
+      <p:nvGrpSpPr>
+        <p:cNvPr id="1" name=""/>
+        <p:cNvGrpSpPr/>
+        <p:nvPr/>
+      </p:nvGrpSpPr>
+      <p:grpSpPr>
+        <a:xfrm>
+          <a:off x="0" y="0"/>
+          <a:ext cx="0" cy="0"/>
+          <a:chOff x="0" y="0"/>
+          <a:chExt cx="0" cy="0"/>
+        </a:xfrm>
+      </p:grpSpPr>
+      <p:sp>
+        <p:nvSpPr>
+          <p:cNvPr id="2" name="Title 1">
+            <a:extLst>
+              <a:ext uri="{FF2B5EF4-FFF2-40B4-BE49-F238E27FC236}">
+                <a16:creationId xmlns:a16="http://schemas.microsoft.com/office/drawing/2014/main" id="{C7079EC8-E960-47A9-8A9E-7B9B7A53907E}"/>
+              </a:ext>
+            </a:extLst>
+          </p:cNvPr>
+          <p:cNvSpPr>
+            <a:spLocks noGrp="1"/>
+          </p:cNvSpPr>
+          <p:nvPr>
+            <p:ph type="title"/>
+          </p:nvPr>
+        </p:nvSpPr>
+        <p:spPr/>
+        <p:txBody>
+          <a:bodyPr/>
+          <a:lstStyle/>
+          <a:p>
+            <a:r>
+              <a:rPr lang="en-US" dirty="0"/>
+              <a:t>Lets look at lambda declaring a “function”</a:t>
+            </a:r>
+          </a:p>
+        </p:txBody>
+      </p:sp>
+      <p:sp>
+        <p:nvSpPr>
+          <p:cNvPr id="5" name="TextBox 4">
+            <a:extLst>
+              <a:ext uri="{FF2B5EF4-FFF2-40B4-BE49-F238E27FC236}">
+                <a16:creationId xmlns:a16="http://schemas.microsoft.com/office/drawing/2014/main" id="{FE63B46B-ED12-42A9-9118-351D26FA88D5}"/>
+              </a:ext>
+            </a:extLst>
+          </p:cNvPr>
+          <p:cNvSpPr txBox="1"/>
+          <p:nvPr/>
+        </p:nvSpPr>
+        <p:spPr>
+          <a:xfrm>
+            <a:off x="952500" y="2505670"/>
+            <a:ext cx="10287000" cy="923330"/>
+          </a:xfrm>
+          <a:prstGeom prst="rect">
+            <a:avLst/>
+          </a:prstGeom>
+          <a:solidFill>
+            <a:schemeClr val="tx1"/>
+          </a:solidFill>
+        </p:spPr>
+        <p:txBody>
+          <a:bodyPr wrap="square">
+            <a:spAutoFit/>
+          </a:bodyPr>
+          <a:lstStyle/>
+          <a:p>
+            <a:r>
+              <a:rPr lang="en-US" b="0" dirty="0">
+                <a:solidFill>
+                  <a:srgbClr val="000000"/>
+                </a:solidFill>
+                <a:effectLst/>
+                <a:latin typeface="Consolas" panose="020B0609020204030204" pitchFamily="49" charset="0"/>
+              </a:rPr>
+              <a:t>(</a:t>
+            </a:r>
+            <a:r>
+              <a:rPr lang="en-US" b="0" dirty="0">
+                <a:solidFill>
+                  <a:srgbClr val="AF00DB"/>
+                </a:solidFill>
+                <a:effectLst/>
+                <a:latin typeface="Consolas" panose="020B0609020204030204" pitchFamily="49" charset="0"/>
+              </a:rPr>
+              <a:t>define</a:t>
+            </a:r>
+            <a:r>
+              <a:rPr lang="en-US" b="0" dirty="0">
+                <a:solidFill>
+                  <a:srgbClr val="000000"/>
+                </a:solidFill>
+                <a:effectLst/>
+                <a:latin typeface="Consolas" panose="020B0609020204030204" pitchFamily="49" charset="0"/>
+              </a:rPr>
+              <a:t> </a:t>
+            </a:r>
+            <a:r>
+              <a:rPr lang="en-US" b="0" dirty="0">
+                <a:solidFill>
+                  <a:srgbClr val="001080"/>
+                </a:solidFill>
+                <a:effectLst/>
+                <a:latin typeface="Consolas" panose="020B0609020204030204" pitchFamily="49" charset="0"/>
+              </a:rPr>
+              <a:t>median-of-three</a:t>
+            </a:r>
+            <a:endParaRPr lang="en-US" b="0" dirty="0">
+              <a:solidFill>
+                <a:srgbClr val="000000"/>
+              </a:solidFill>
+              <a:effectLst/>
+              <a:latin typeface="Consolas" panose="020B0609020204030204" pitchFamily="49" charset="0"/>
+            </a:endParaRPr>
+          </a:p>
+          <a:p>
+            <a:r>
+              <a:rPr lang="en-US" b="0" dirty="0">
+                <a:solidFill>
+                  <a:srgbClr val="000000"/>
+                </a:solidFill>
+                <a:effectLst/>
+                <a:latin typeface="Consolas" panose="020B0609020204030204" pitchFamily="49" charset="0"/>
+              </a:rPr>
+              <a:t>  (</a:t>
+            </a:r>
+            <a:r>
+              <a:rPr lang="en-US" b="0" dirty="0">
+                <a:solidFill>
+                  <a:srgbClr val="AF00DB"/>
+                </a:solidFill>
+                <a:effectLst/>
+                <a:latin typeface="Consolas" panose="020B0609020204030204" pitchFamily="49" charset="0"/>
+              </a:rPr>
+              <a:t>lambda</a:t>
+            </a:r>
+            <a:r>
+              <a:rPr lang="en-US" b="0" dirty="0">
+                <a:solidFill>
+                  <a:srgbClr val="000000"/>
+                </a:solidFill>
+                <a:effectLst/>
+                <a:latin typeface="Consolas" panose="020B0609020204030204" pitchFamily="49" charset="0"/>
+              </a:rPr>
+              <a:t> (</a:t>
+            </a:r>
+            <a:r>
+              <a:rPr lang="en-US" b="0" dirty="0">
+                <a:solidFill>
+                  <a:srgbClr val="001080"/>
+                </a:solidFill>
+                <a:effectLst/>
+                <a:latin typeface="Consolas" panose="020B0609020204030204" pitchFamily="49" charset="0"/>
+              </a:rPr>
+              <a:t>a b c</a:t>
+            </a:r>
+            <a:r>
+              <a:rPr lang="en-US" b="0" dirty="0">
+                <a:solidFill>
+                  <a:srgbClr val="000000"/>
+                </a:solidFill>
+                <a:effectLst/>
+                <a:latin typeface="Consolas" panose="020B0609020204030204" pitchFamily="49" charset="0"/>
+              </a:rPr>
+              <a:t>)</a:t>
+            </a:r>
+          </a:p>
+          <a:p>
+            <a:r>
+              <a:rPr lang="en-US" b="0" dirty="0">
+                <a:solidFill>
+                  <a:srgbClr val="000000"/>
+                </a:solidFill>
+                <a:effectLst/>
+                <a:latin typeface="Consolas" panose="020B0609020204030204" pitchFamily="49" charset="0"/>
+              </a:rPr>
+              <a:t>    (- (+ a b c) (</a:t>
+            </a:r>
+            <a:r>
+              <a:rPr lang="en-US" b="0" dirty="0">
+                <a:solidFill>
+                  <a:srgbClr val="795E26"/>
+                </a:solidFill>
+                <a:effectLst/>
+                <a:latin typeface="Consolas" panose="020B0609020204030204" pitchFamily="49" charset="0"/>
+              </a:rPr>
+              <a:t>max</a:t>
+            </a:r>
+            <a:r>
+              <a:rPr lang="en-US" b="0" dirty="0">
+                <a:solidFill>
+                  <a:srgbClr val="000000"/>
+                </a:solidFill>
+                <a:effectLst/>
+                <a:latin typeface="Consolas" panose="020B0609020204030204" pitchFamily="49" charset="0"/>
+              </a:rPr>
+              <a:t> a b c) (</a:t>
+            </a:r>
+            <a:r>
+              <a:rPr lang="en-US" b="0" dirty="0">
+                <a:solidFill>
+                  <a:srgbClr val="795E26"/>
+                </a:solidFill>
+                <a:effectLst/>
+                <a:latin typeface="Consolas" panose="020B0609020204030204" pitchFamily="49" charset="0"/>
+              </a:rPr>
+              <a:t>min</a:t>
+            </a:r>
+            <a:r>
+              <a:rPr lang="en-US" b="0" dirty="0">
+                <a:solidFill>
+                  <a:srgbClr val="000000"/>
+                </a:solidFill>
+                <a:effectLst/>
+                <a:latin typeface="Consolas" panose="020B0609020204030204" pitchFamily="49" charset="0"/>
+              </a:rPr>
+              <a:t> a b c))))</a:t>
+            </a:r>
+          </a:p>
+        </p:txBody>
+      </p:sp>
+      <p:sp>
+        <p:nvSpPr>
+          <p:cNvPr id="7" name="Speech Bubble: Rectangle with Corners Rounded 6">
+            <a:extLst>
+              <a:ext uri="{FF2B5EF4-FFF2-40B4-BE49-F238E27FC236}">
+                <a16:creationId xmlns:a16="http://schemas.microsoft.com/office/drawing/2014/main" id="{E724C28E-ECC0-40A5-98D7-126F7E5889EA}"/>
+              </a:ext>
+            </a:extLst>
+          </p:cNvPr>
+          <p:cNvSpPr/>
+          <p:nvPr/>
+        </p:nvSpPr>
+        <p:spPr bwMode="auto">
+          <a:xfrm>
+            <a:off x="4876800" y="1504454"/>
+            <a:ext cx="2819400" cy="457200"/>
+          </a:xfrm>
+          <a:prstGeom prst="wedgeRoundRectCallout">
+            <a:avLst>
+              <a:gd name="adj1" fmla="val -106547"/>
+              <a:gd name="adj2" fmla="val 279167"/>
+              <a:gd name="adj3" fmla="val 16667"/>
+            </a:avLst>
+          </a:prstGeom>
+          <a:solidFill>
+            <a:schemeClr val="accent1"/>
+          </a:solidFill>
+          <a:ln w="9525" cap="flat" cmpd="sng" algn="ctr">
+            <a:solidFill>
+              <a:schemeClr val="tx1"/>
+            </a:solidFill>
+            <a:prstDash val="solid"/>
+            <a:round/>
+            <a:headEnd type="none" w="med" len="med"/>
+            <a:tailEnd type="none" w="med" len="med"/>
+          </a:ln>
+          <a:effectLst/>
+        </p:spPr>
+        <p:txBody>
+          <a:bodyPr vert="horz" wrap="square" lIns="91440" tIns="45720" rIns="91440" bIns="45720" numCol="1" rtlCol="0" anchor="t" anchorCtr="0" compatLnSpc="1">
+            <a:prstTxWarp prst="textNoShape">
+              <a:avLst/>
+            </a:prstTxWarp>
+          </a:bodyPr>
+          <a:lstStyle/>
+          <a:p>
+            <a:pPr marL="0" marR="0" indent="0" algn="l" defTabSz="914400" rtl="0" eaLnBrk="0" fontAlgn="base" latinLnBrk="0" hangingPunct="0">
+              <a:lnSpc>
+                <a:spcPct val="100000"/>
+              </a:lnSpc>
+              <a:spcBef>
+                <a:spcPct val="0"/>
+              </a:spcBef>
+              <a:spcAft>
+                <a:spcPct val="0"/>
+              </a:spcAft>
+              <a:buClrTx/>
+              <a:buSzTx/>
+              <a:buFontTx/>
+              <a:buNone/>
+              <a:tabLst/>
+            </a:pPr>
+            <a:r>
+              <a:rPr kumimoji="0" lang="en-US" sz="1800" b="0" i="0" u="none" strike="noStrike" cap="none" normalizeH="0" baseline="0" dirty="0">
+                <a:ln>
+                  <a:noFill/>
+                </a:ln>
+                <a:solidFill>
+                  <a:schemeClr val="tx1"/>
+                </a:solidFill>
+                <a:effectLst/>
+                <a:latin typeface="Verdana" pitchFamily="34" charset="0"/>
+              </a:rPr>
+              <a:t>parameters</a:t>
+            </a:r>
+          </a:p>
+        </p:txBody>
+      </p:sp>
+      <p:sp>
+        <p:nvSpPr>
+          <p:cNvPr id="8" name="Speech Bubble: Rectangle with Corners Rounded 7">
+            <a:extLst>
+              <a:ext uri="{FF2B5EF4-FFF2-40B4-BE49-F238E27FC236}">
+                <a16:creationId xmlns:a16="http://schemas.microsoft.com/office/drawing/2014/main" id="{50B0AD70-17B2-449D-8796-AC39B8E330B0}"/>
+              </a:ext>
+            </a:extLst>
+          </p:cNvPr>
+          <p:cNvSpPr/>
+          <p:nvPr/>
+        </p:nvSpPr>
+        <p:spPr bwMode="auto">
+          <a:xfrm>
+            <a:off x="4876800" y="4453671"/>
+            <a:ext cx="4267200" cy="457200"/>
+          </a:xfrm>
+          <a:prstGeom prst="wedgeRoundRectCallout">
+            <a:avLst>
+              <a:gd name="adj1" fmla="val -56354"/>
+              <a:gd name="adj2" fmla="val -256547"/>
+              <a:gd name="adj3" fmla="val 16667"/>
+            </a:avLst>
+          </a:prstGeom>
+          <a:solidFill>
+            <a:schemeClr val="accent1"/>
+          </a:solidFill>
+          <a:ln w="9525" cap="flat" cmpd="sng" algn="ctr">
+            <a:solidFill>
+              <a:schemeClr val="tx1"/>
+            </a:solidFill>
+            <a:prstDash val="solid"/>
+            <a:round/>
+            <a:headEnd type="none" w="med" len="med"/>
+            <a:tailEnd type="none" w="med" len="med"/>
+          </a:ln>
+          <a:effectLst/>
+        </p:spPr>
+        <p:txBody>
+          <a:bodyPr vert="horz" wrap="square" lIns="91440" tIns="45720" rIns="91440" bIns="45720" numCol="1" rtlCol="0" anchor="t" anchorCtr="0" compatLnSpc="1">
+            <a:prstTxWarp prst="textNoShape">
+              <a:avLst/>
+            </a:prstTxWarp>
+          </a:bodyPr>
+          <a:lstStyle/>
+          <a:p>
+            <a:pPr marL="0" marR="0" indent="0" algn="l" defTabSz="914400" rtl="0" eaLnBrk="0" fontAlgn="base" latinLnBrk="0" hangingPunct="0">
+              <a:lnSpc>
+                <a:spcPct val="100000"/>
+              </a:lnSpc>
+              <a:spcBef>
+                <a:spcPct val="0"/>
+              </a:spcBef>
+              <a:spcAft>
+                <a:spcPct val="0"/>
+              </a:spcAft>
+              <a:buClrTx/>
+              <a:buSzTx/>
+              <a:buFontTx/>
+              <a:buNone/>
+              <a:tabLst/>
+            </a:pPr>
+            <a:r>
+              <a:rPr lang="en-US" dirty="0"/>
+              <a:t>Body – doesn’t run until later</a:t>
+            </a:r>
+            <a:endParaRPr kumimoji="0" lang="en-US" sz="1800" b="0" i="0" u="none" strike="noStrike" cap="none" normalizeH="0" baseline="0" dirty="0">
+              <a:ln>
+                <a:noFill/>
+              </a:ln>
+              <a:solidFill>
+                <a:schemeClr val="tx1"/>
+              </a:solidFill>
+              <a:effectLst/>
+              <a:latin typeface="Verdana" pitchFamily="34" charset="0"/>
+            </a:endParaRPr>
+          </a:p>
+        </p:txBody>
+      </p:sp>
+      <p:sp>
+        <p:nvSpPr>
+          <p:cNvPr id="9" name="Speech Bubble: Rectangle with Corners Rounded 8">
+            <a:extLst>
+              <a:ext uri="{FF2B5EF4-FFF2-40B4-BE49-F238E27FC236}">
+                <a16:creationId xmlns:a16="http://schemas.microsoft.com/office/drawing/2014/main" id="{7C4E8E51-AD42-4FA1-8002-136134808BF7}"/>
+              </a:ext>
+            </a:extLst>
+          </p:cNvPr>
+          <p:cNvSpPr/>
+          <p:nvPr/>
+        </p:nvSpPr>
+        <p:spPr bwMode="auto">
+          <a:xfrm>
+            <a:off x="609600" y="1600200"/>
+            <a:ext cx="3505200" cy="457200"/>
+          </a:xfrm>
+          <a:prstGeom prst="wedgeRoundRectCallout">
+            <a:avLst>
+              <a:gd name="adj1" fmla="val 23896"/>
+              <a:gd name="adj2" fmla="val 172024"/>
+              <a:gd name="adj3" fmla="val 16667"/>
+            </a:avLst>
+          </a:prstGeom>
+          <a:solidFill>
+            <a:schemeClr val="accent1"/>
+          </a:solidFill>
+          <a:ln w="9525" cap="flat" cmpd="sng" algn="ctr">
+            <a:solidFill>
+              <a:schemeClr val="tx1"/>
+            </a:solidFill>
+            <a:prstDash val="solid"/>
+            <a:round/>
+            <a:headEnd type="none" w="med" len="med"/>
+            <a:tailEnd type="none" w="med" len="med"/>
+          </a:ln>
+          <a:effectLst/>
+        </p:spPr>
+        <p:txBody>
+          <a:bodyPr vert="horz" wrap="square" lIns="91440" tIns="45720" rIns="91440" bIns="45720" numCol="1" rtlCol="0" anchor="t" anchorCtr="0" compatLnSpc="1">
+            <a:prstTxWarp prst="textNoShape">
+              <a:avLst/>
+            </a:prstTxWarp>
+          </a:bodyPr>
+          <a:lstStyle/>
+          <a:p>
+            <a:pPr marL="0" marR="0" indent="0" algn="l" defTabSz="914400" rtl="0" eaLnBrk="0" fontAlgn="base" latinLnBrk="0" hangingPunct="0">
+              <a:lnSpc>
+                <a:spcPct val="100000"/>
+              </a:lnSpc>
+              <a:spcBef>
+                <a:spcPct val="0"/>
+              </a:spcBef>
+              <a:spcAft>
+                <a:spcPct val="0"/>
+              </a:spcAft>
+              <a:buClrTx/>
+              <a:buSzTx/>
+              <a:buFontTx/>
+              <a:buNone/>
+              <a:tabLst/>
+            </a:pPr>
+            <a:r>
+              <a:rPr kumimoji="0" lang="en-US" sz="1800" b="0" i="0" u="none" strike="noStrike" cap="none" normalizeH="0" baseline="0" dirty="0">
+                <a:ln>
+                  <a:noFill/>
+                </a:ln>
+                <a:solidFill>
+                  <a:schemeClr val="tx1"/>
+                </a:solidFill>
+                <a:effectLst/>
+                <a:latin typeface="Verdana" pitchFamily="34" charset="0"/>
+              </a:rPr>
+              <a:t>Name (not part of lambda)</a:t>
+            </a:r>
+          </a:p>
+        </p:txBody>
+      </p:sp>
+      <p:sp>
+        <p:nvSpPr>
+          <p:cNvPr id="11" name="Rectangle 1">
+            <a:extLst>
+              <a:ext uri="{FF2B5EF4-FFF2-40B4-BE49-F238E27FC236}">
+                <a16:creationId xmlns:a16="http://schemas.microsoft.com/office/drawing/2014/main" id="{0D5D01B4-178A-4826-8F01-D13D8F0A1DFA}"/>
+              </a:ext>
+            </a:extLst>
+          </p:cNvPr>
+          <p:cNvSpPr>
+            <a:spLocks noChangeArrowheads="1"/>
+          </p:cNvSpPr>
+          <p:nvPr/>
+        </p:nvSpPr>
+        <p:spPr bwMode="auto">
+          <a:xfrm>
+            <a:off x="685800" y="5673932"/>
+            <a:ext cx="7907934" cy="523220"/>
+          </a:xfrm>
+          <a:prstGeom prst="rect">
+            <a:avLst/>
+          </a:prstGeom>
+          <a:noFill/>
+          <a:ln>
+            <a:noFill/>
+          </a:ln>
+          <a:effectLst/>
+          <a:extLst>
+            <a:ext uri="{909E8E84-426E-40DD-AFC4-6F175D3DCCD1}">
+              <a14:hiddenFill xmlns:a14="http://schemas.microsoft.com/office/drawing/2010/main">
+                <a:solidFill>
+                  <a:schemeClr val="accent1"/>
+                </a:solidFill>
+              </a14:hiddenFill>
+            </a:ext>
+            <a:ext uri="{91240B29-F687-4F45-9708-019B960494DF}">
+              <a14:hiddenLine xmlns:a14="http://schemas.microsoft.com/office/drawing/2010/main" w="9525">
+                <a:solidFill>
+                  <a:schemeClr val="tx1"/>
+                </a:solidFill>
+                <a:miter lim="800000"/>
+                <a:headEnd/>
+                <a:tailEnd/>
+              </a14:hiddenLine>
+            </a:ext>
+            <a:ext uri="{AF507438-7753-43E0-B8FC-AC1667EBCBE1}">
+              <a14:hiddenEffects xmlns:a14="http://schemas.microsoft.com/office/drawing/2010/main">
+                <a:effectLst>
+                  <a:outerShdw dist="35921" dir="2700000" algn="ctr" rotWithShape="0">
+                    <a:schemeClr val="bg2"/>
+                  </a:outerShdw>
+                </a:effectLst>
+              </a14:hiddenEffects>
+            </a:ext>
+          </a:extLst>
+        </p:spPr>
+        <p:txBody>
+          <a:bodyPr vert="horz" wrap="none" lIns="91440" tIns="45720" rIns="91440" bIns="45720" numCol="1" anchor="ctr" anchorCtr="0" compatLnSpc="1">
+            <a:prstTxWarp prst="textNoShape">
+              <a:avLst/>
+            </a:prstTxWarp>
+            <a:spAutoFit/>
+          </a:bodyPr>
+          <a:lstStyle/>
+          <a:p>
+            <a:pPr marL="0" marR="0" lvl="0" indent="0" algn="l" defTabSz="914400" rtl="0" eaLnBrk="0" fontAlgn="base" latinLnBrk="0" hangingPunct="0">
+              <a:lnSpc>
+                <a:spcPct val="100000"/>
+              </a:lnSpc>
+              <a:spcBef>
+                <a:spcPct val="0"/>
+              </a:spcBef>
+              <a:spcAft>
+                <a:spcPct val="0"/>
+              </a:spcAft>
+              <a:buClrTx/>
+              <a:buSzTx/>
+              <a:buFontTx/>
+              <a:buNone/>
+              <a:tabLst/>
+            </a:pPr>
+            <a:r>
+              <a:rPr kumimoji="0" lang="en-US" altLang="en-US" sz="2800" b="0" i="0" u="none" strike="noStrike" cap="none" normalizeH="0" baseline="0" dirty="0">
+                <a:ln>
+                  <a:noFill/>
+                </a:ln>
+                <a:solidFill>
+                  <a:schemeClr val="tx1"/>
+                </a:solidFill>
+                <a:effectLst/>
+                <a:latin typeface="Consolas" panose="020B0609020204030204" pitchFamily="49" charset="0"/>
+              </a:rPr>
+              <a:t>(lambda (</a:t>
+            </a:r>
+            <a:r>
+              <a:rPr kumimoji="0" lang="en-US" altLang="en-US" sz="2800" b="0" i="1" u="none" strike="noStrike" cap="none" normalizeH="0" baseline="0" dirty="0">
+                <a:ln>
+                  <a:noFill/>
+                </a:ln>
+                <a:solidFill>
+                  <a:schemeClr val="tx1"/>
+                </a:solidFill>
+                <a:effectLst/>
+                <a:latin typeface="Consolas" panose="020B0609020204030204" pitchFamily="49" charset="0"/>
+              </a:rPr>
+              <a:t>var</a:t>
+            </a:r>
+            <a:r>
+              <a:rPr kumimoji="0" lang="en-US" altLang="en-US" sz="2800" b="0" i="1" u="none" strike="noStrike" cap="none" normalizeH="0" baseline="-30000" dirty="0">
+                <a:ln>
+                  <a:noFill/>
+                </a:ln>
+                <a:solidFill>
+                  <a:schemeClr val="tx1"/>
+                </a:solidFill>
+                <a:effectLst/>
+                <a:latin typeface="Consolas" panose="020B0609020204030204" pitchFamily="49" charset="0"/>
+              </a:rPr>
+              <a:t>1</a:t>
+            </a:r>
+            <a:r>
+              <a:rPr kumimoji="0" lang="en-US" altLang="en-US" sz="2800" b="0" i="0" u="none" strike="noStrike" cap="none" normalizeH="0" baseline="0" dirty="0">
+                <a:ln>
+                  <a:noFill/>
+                </a:ln>
+                <a:solidFill>
+                  <a:schemeClr val="tx1"/>
+                </a:solidFill>
+                <a:effectLst/>
+                <a:latin typeface="Consolas" panose="020B0609020204030204" pitchFamily="49" charset="0"/>
+              </a:rPr>
+              <a:t> ... </a:t>
+            </a:r>
+            <a:r>
+              <a:rPr kumimoji="0" lang="en-US" altLang="en-US" sz="2800" b="0" i="1" u="none" strike="noStrike" cap="none" normalizeH="0" baseline="0" dirty="0" err="1">
+                <a:ln>
+                  <a:noFill/>
+                </a:ln>
+                <a:solidFill>
+                  <a:schemeClr val="tx1"/>
+                </a:solidFill>
+                <a:effectLst/>
+                <a:latin typeface="Consolas" panose="020B0609020204030204" pitchFamily="49" charset="0"/>
+              </a:rPr>
+              <a:t>var</a:t>
+            </a:r>
+            <a:r>
+              <a:rPr kumimoji="0" lang="en-US" altLang="en-US" sz="2800" b="0" i="1" u="none" strike="noStrike" cap="none" normalizeH="0" baseline="-30000" dirty="0" err="1">
+                <a:ln>
+                  <a:noFill/>
+                </a:ln>
+                <a:solidFill>
+                  <a:schemeClr val="tx1"/>
+                </a:solidFill>
+                <a:effectLst/>
+                <a:latin typeface="Consolas" panose="020B0609020204030204" pitchFamily="49" charset="0"/>
+              </a:rPr>
+              <a:t>n</a:t>
+            </a:r>
+            <a:r>
+              <a:rPr kumimoji="0" lang="en-US" altLang="en-US" sz="2800" b="0" i="0" u="none" strike="noStrike" cap="none" normalizeH="0" baseline="0" dirty="0">
+                <a:ln>
+                  <a:noFill/>
+                </a:ln>
+                <a:solidFill>
+                  <a:schemeClr val="tx1"/>
+                </a:solidFill>
+                <a:effectLst/>
+                <a:latin typeface="Consolas" panose="020B0609020204030204" pitchFamily="49" charset="0"/>
+              </a:rPr>
+              <a:t>) </a:t>
+            </a:r>
+            <a:r>
+              <a:rPr kumimoji="0" lang="en-US" altLang="en-US" sz="2800" b="0" i="1" u="none" strike="noStrike" cap="none" normalizeH="0" baseline="0" dirty="0">
+                <a:ln>
+                  <a:noFill/>
+                </a:ln>
+                <a:solidFill>
+                  <a:schemeClr val="tx1"/>
+                </a:solidFill>
+                <a:effectLst/>
+                <a:latin typeface="Consolas" panose="020B0609020204030204" pitchFamily="49" charset="0"/>
+              </a:rPr>
+              <a:t>body</a:t>
+            </a:r>
+            <a:r>
+              <a:rPr kumimoji="0" lang="en-US" altLang="en-US" sz="2800" b="0" i="1" u="none" strike="noStrike" cap="none" normalizeH="0" baseline="-30000" dirty="0">
+                <a:ln>
+                  <a:noFill/>
+                </a:ln>
+                <a:solidFill>
+                  <a:schemeClr val="tx1"/>
+                </a:solidFill>
+                <a:effectLst/>
+                <a:latin typeface="Consolas" panose="020B0609020204030204" pitchFamily="49" charset="0"/>
+              </a:rPr>
+              <a:t>1</a:t>
+            </a:r>
+            <a:r>
+              <a:rPr kumimoji="0" lang="en-US" altLang="en-US" sz="2800" b="0" i="0" u="none" strike="noStrike" cap="none" normalizeH="0" baseline="0" dirty="0">
+                <a:ln>
+                  <a:noFill/>
+                </a:ln>
+                <a:solidFill>
+                  <a:schemeClr val="tx1"/>
+                </a:solidFill>
+                <a:effectLst/>
+                <a:latin typeface="Consolas" panose="020B0609020204030204" pitchFamily="49" charset="0"/>
+              </a:rPr>
+              <a:t> </a:t>
+            </a:r>
+            <a:r>
+              <a:rPr kumimoji="0" lang="en-US" altLang="en-US" sz="2800" b="0" i="1" u="none" strike="noStrike" cap="none" normalizeH="0" baseline="0" dirty="0">
+                <a:ln>
+                  <a:noFill/>
+                </a:ln>
+                <a:solidFill>
+                  <a:schemeClr val="tx1"/>
+                </a:solidFill>
+                <a:effectLst/>
+                <a:latin typeface="Consolas" panose="020B0609020204030204" pitchFamily="49" charset="0"/>
+              </a:rPr>
+              <a:t>body</a:t>
+            </a:r>
+            <a:r>
+              <a:rPr kumimoji="0" lang="en-US" altLang="en-US" sz="2800" b="0" i="1" u="none" strike="noStrike" cap="none" normalizeH="0" baseline="-30000" dirty="0">
+                <a:ln>
+                  <a:noFill/>
+                </a:ln>
+                <a:solidFill>
+                  <a:schemeClr val="tx1"/>
+                </a:solidFill>
+                <a:effectLst/>
+                <a:latin typeface="Consolas" panose="020B0609020204030204" pitchFamily="49" charset="0"/>
+              </a:rPr>
+              <a:t>2</a:t>
+            </a:r>
+            <a:r>
+              <a:rPr kumimoji="0" lang="en-US" altLang="en-US" sz="2800" b="0" i="0" u="none" strike="noStrike" cap="none" normalizeH="0" baseline="0" dirty="0">
+                <a:ln>
+                  <a:noFill/>
+                </a:ln>
+                <a:solidFill>
+                  <a:schemeClr val="tx1"/>
+                </a:solidFill>
+                <a:effectLst/>
+                <a:latin typeface="Consolas" panose="020B0609020204030204" pitchFamily="49" charset="0"/>
+              </a:rPr>
+              <a:t> ...)</a:t>
+            </a:r>
+            <a:r>
+              <a:rPr kumimoji="0" lang="en-US" altLang="en-US" sz="1600" b="0" i="0" u="none" strike="noStrike" cap="none" normalizeH="0" baseline="0" dirty="0">
+                <a:ln>
+                  <a:noFill/>
+                </a:ln>
+                <a:solidFill>
+                  <a:schemeClr val="tx1"/>
+                </a:solidFill>
+                <a:effectLst/>
+                <a:latin typeface="Consolas" panose="020B0609020204030204" pitchFamily="49" charset="0"/>
+              </a:rPr>
+              <a:t> </a:t>
+            </a:r>
+            <a:endParaRPr kumimoji="0" lang="en-US" altLang="en-US" sz="5400" b="0" i="0" u="none" strike="noStrike" cap="none" normalizeH="0" baseline="0" dirty="0">
+              <a:ln>
+                <a:noFill/>
+              </a:ln>
+              <a:solidFill>
+                <a:schemeClr val="tx1"/>
+              </a:solidFill>
+              <a:effectLst/>
+              <a:latin typeface="Consolas" panose="020B0609020204030204" pitchFamily="49" charset="0"/>
+            </a:endParaRPr>
+          </a:p>
+        </p:txBody>
+      </p:sp>
+      <p:sp>
+        <p:nvSpPr>
+          <p:cNvPr id="13" name="TextBox 12">
+            <a:extLst>
+              <a:ext uri="{FF2B5EF4-FFF2-40B4-BE49-F238E27FC236}">
+                <a16:creationId xmlns:a16="http://schemas.microsoft.com/office/drawing/2014/main" id="{D9406FEA-93E4-49DC-870D-845C4B87ACA3}"/>
+              </a:ext>
+            </a:extLst>
+          </p:cNvPr>
+          <p:cNvSpPr txBox="1"/>
+          <p:nvPr/>
+        </p:nvSpPr>
+        <p:spPr>
+          <a:xfrm>
+            <a:off x="3048000" y="6324600"/>
+            <a:ext cx="4659481" cy="369332"/>
+          </a:xfrm>
+          <a:prstGeom prst="rect">
+            <a:avLst/>
+          </a:prstGeom>
+          <a:noFill/>
+        </p:spPr>
+        <p:txBody>
+          <a:bodyPr wrap="none" rtlCol="0">
+            <a:spAutoFit/>
+          </a:bodyPr>
+          <a:lstStyle/>
+          <a:p>
+            <a:r>
+              <a:rPr lang="en-US" i="1" dirty="0"/>
+              <a:t>Formal details in TSPL 4.2 and onward</a:t>
+            </a:r>
+          </a:p>
+        </p:txBody>
+      </p:sp>
+    </p:spTree>
+    <p:extLst>
+      <p:ext uri="{BB962C8B-B14F-4D97-AF65-F5344CB8AC3E}">
+        <p14:creationId xmlns:p14="http://schemas.microsoft.com/office/powerpoint/2010/main" val="2247978926"/>
+      </p:ext>
+    </p:extLst>
+  </p:cSld>
+  <p:clrMapOvr>
+    <a:masterClrMapping/>
+  </p:clrMapOvr>
+</p:sld>
+</file>
+
+<file path=ppt/slides/slide9.xml><?xml version="1.0" encoding="utf-8"?>
+<p:sld xmlns:a="http://schemas.openxmlformats.org/drawingml/2006/main" xmlns:r="http://schemas.openxmlformats.org/officeDocument/2006/relationships" xmlns:p="http://schemas.openxmlformats.org/presentationml/2006/main">
+  <p:cSld>
+    <p:spTree>
+      <p:nvGrpSpPr>
+        <p:cNvPr id="1" name=""/>
+        <p:cNvGrpSpPr/>
+        <p:nvPr/>
+      </p:nvGrpSpPr>
+      <p:grpSpPr>
+        <a:xfrm>
+          <a:off x="0" y="0"/>
+          <a:ext cx="0" cy="0"/>
+          <a:chOff x="0" y="0"/>
+          <a:chExt cx="0" cy="0"/>
+        </a:xfrm>
+      </p:grpSpPr>
+      <p:sp>
+        <p:nvSpPr>
+          <p:cNvPr id="2" name="Title 1">
+            <a:extLst>
+              <a:ext uri="{FF2B5EF4-FFF2-40B4-BE49-F238E27FC236}">
+                <a16:creationId xmlns:a16="http://schemas.microsoft.com/office/drawing/2014/main" id="{7385845F-3F63-4370-B1DE-632D2EB54A49}"/>
+              </a:ext>
+            </a:extLst>
+          </p:cNvPr>
+          <p:cNvSpPr>
+            <a:spLocks noGrp="1"/>
+          </p:cNvSpPr>
+          <p:nvPr>
+            <p:ph type="title"/>
+          </p:nvPr>
+        </p:nvSpPr>
+        <p:spPr>
+          <a:xfrm>
+            <a:off x="304800" y="277814"/>
+            <a:ext cx="11506200" cy="1139825"/>
+          </a:xfrm>
+        </p:spPr>
+        <p:txBody>
+          <a:bodyPr/>
+          <a:lstStyle/>
+          <a:p>
+            <a:r>
+              <a:rPr lang="en-US" dirty="0"/>
+              <a:t>Lambda is a syntax that returns a procedure</a:t>
+            </a:r>
+          </a:p>
+        </p:txBody>
+      </p:sp>
+      <p:sp>
+        <p:nvSpPr>
+          <p:cNvPr id="4" name="Rectangle 1">
+            <a:extLst>
+              <a:ext uri="{FF2B5EF4-FFF2-40B4-BE49-F238E27FC236}">
+                <a16:creationId xmlns:a16="http://schemas.microsoft.com/office/drawing/2014/main" id="{05F2C6F3-FD91-4C0E-86F7-445CBD0B167C}"/>
+              </a:ext>
+            </a:extLst>
+          </p:cNvPr>
+          <p:cNvSpPr>
+            <a:spLocks noChangeArrowheads="1"/>
+          </p:cNvSpPr>
+          <p:nvPr/>
+        </p:nvSpPr>
+        <p:spPr bwMode="auto">
+          <a:xfrm>
+            <a:off x="1143000" y="2316688"/>
+            <a:ext cx="7930376" cy="461665"/>
+          </a:xfrm>
+          <a:prstGeom prst="rect">
+            <a:avLst/>
+          </a:prstGeom>
+          <a:solidFill>
+            <a:schemeClr val="tx1"/>
+          </a:solidFill>
+          <a:ln>
+            <a:noFill/>
+          </a:ln>
+          <a:effectLst/>
+        </p:spPr>
+        <p:txBody>
+          <a:bodyPr vert="horz" wrap="none" lIns="91440" tIns="45720" rIns="91440" bIns="45720" numCol="1" anchor="ctr" anchorCtr="0" compatLnSpc="1">
+            <a:prstTxWarp prst="textNoShape">
+              <a:avLst/>
+            </a:prstTxWarp>
+            <a:spAutoFit/>
+          </a:bodyPr>
+          <a:lstStyle/>
+          <a:p>
+            <a:pPr marL="0" marR="0" lvl="0" indent="0" algn="l" defTabSz="914400" rtl="0" eaLnBrk="0" fontAlgn="base" latinLnBrk="0" hangingPunct="0">
+              <a:lnSpc>
+                <a:spcPct val="100000"/>
+              </a:lnSpc>
+              <a:spcBef>
+                <a:spcPct val="0"/>
+              </a:spcBef>
+              <a:spcAft>
+                <a:spcPct val="0"/>
+              </a:spcAft>
+              <a:buClrTx/>
+              <a:buSzTx/>
+              <a:buFontTx/>
+              <a:buNone/>
+              <a:tabLst/>
+            </a:pPr>
+            <a:r>
+              <a:rPr kumimoji="0" lang="en-US" altLang="en-US" sz="2400" b="0" i="0" u="none" strike="noStrike" cap="none" normalizeH="0" baseline="0" dirty="0">
+                <a:ln>
+                  <a:noFill/>
+                </a:ln>
+                <a:solidFill>
+                  <a:schemeClr val="bg2"/>
+                </a:solidFill>
+                <a:effectLst/>
+                <a:latin typeface="Consolas" panose="020B0609020204030204" pitchFamily="49" charset="0"/>
+              </a:rPr>
+              <a:t>add1 = function(number) { return number + 1 }</a:t>
+            </a:r>
+            <a:r>
+              <a:rPr kumimoji="0" lang="en-US" altLang="en-US" sz="1400" b="0" i="0" u="none" strike="noStrike" cap="none" normalizeH="0" baseline="0" dirty="0">
+                <a:ln>
+                  <a:noFill/>
+                </a:ln>
+                <a:solidFill>
+                  <a:schemeClr val="bg2"/>
+                </a:solidFill>
+                <a:effectLst/>
+                <a:latin typeface="Consolas" panose="020B0609020204030204" pitchFamily="49" charset="0"/>
+              </a:rPr>
+              <a:t> </a:t>
+            </a:r>
+            <a:endParaRPr kumimoji="0" lang="en-US" altLang="en-US" sz="4800" b="0" i="0" u="none" strike="noStrike" cap="none" normalizeH="0" baseline="0" dirty="0">
+              <a:ln>
+                <a:noFill/>
+              </a:ln>
+              <a:solidFill>
+                <a:schemeClr val="bg2"/>
+              </a:solidFill>
+              <a:effectLst/>
+              <a:latin typeface="Consolas" panose="020B0609020204030204" pitchFamily="49" charset="0"/>
+            </a:endParaRPr>
+          </a:p>
+        </p:txBody>
+      </p:sp>
+      <p:sp>
+        <p:nvSpPr>
+          <p:cNvPr id="5" name="TextBox 4">
+            <a:extLst>
+              <a:ext uri="{FF2B5EF4-FFF2-40B4-BE49-F238E27FC236}">
+                <a16:creationId xmlns:a16="http://schemas.microsoft.com/office/drawing/2014/main" id="{B068ABCB-97B3-475D-8CA2-4AA8DA66F5C5}"/>
+              </a:ext>
+            </a:extLst>
+          </p:cNvPr>
+          <p:cNvSpPr txBox="1"/>
+          <p:nvPr/>
+        </p:nvSpPr>
+        <p:spPr>
+          <a:xfrm>
+            <a:off x="914400" y="1771418"/>
+            <a:ext cx="4270721" cy="461665"/>
+          </a:xfrm>
+          <a:prstGeom prst="rect">
+            <a:avLst/>
+          </a:prstGeom>
+          <a:noFill/>
+        </p:spPr>
+        <p:txBody>
+          <a:bodyPr wrap="none" rtlCol="0">
+            <a:spAutoFit/>
+          </a:bodyPr>
+          <a:lstStyle/>
+          <a:p>
+            <a:r>
+              <a:rPr lang="en-US" sz="2400" b="1" dirty="0">
+                <a:solidFill>
+                  <a:schemeClr val="accent1"/>
+                </a:solidFill>
+              </a:rPr>
+              <a:t>Same idea in </a:t>
+            </a:r>
+            <a:r>
+              <a:rPr lang="en-US" sz="2400" b="1" dirty="0" err="1">
+                <a:solidFill>
+                  <a:schemeClr val="accent1"/>
+                </a:solidFill>
+              </a:rPr>
+              <a:t>Javascript</a:t>
+            </a:r>
+            <a:endParaRPr lang="en-US" sz="2400" b="1" dirty="0">
+              <a:solidFill>
+                <a:schemeClr val="accent1"/>
+              </a:solidFill>
+            </a:endParaRPr>
+          </a:p>
+        </p:txBody>
+      </p:sp>
+      <p:sp>
+        <p:nvSpPr>
+          <p:cNvPr id="6" name="TextBox 5">
+            <a:extLst>
+              <a:ext uri="{FF2B5EF4-FFF2-40B4-BE49-F238E27FC236}">
+                <a16:creationId xmlns:a16="http://schemas.microsoft.com/office/drawing/2014/main" id="{FEFA48E9-AB5D-4802-A793-EB81B4A996CA}"/>
+              </a:ext>
+            </a:extLst>
+          </p:cNvPr>
+          <p:cNvSpPr txBox="1"/>
+          <p:nvPr/>
+        </p:nvSpPr>
+        <p:spPr>
+          <a:xfrm>
+            <a:off x="914400" y="2883730"/>
+            <a:ext cx="6882012" cy="461665"/>
+          </a:xfrm>
+          <a:prstGeom prst="rect">
+            <a:avLst/>
+          </a:prstGeom>
+          <a:noFill/>
+        </p:spPr>
+        <p:txBody>
+          <a:bodyPr wrap="none" rtlCol="0">
+            <a:spAutoFit/>
+          </a:bodyPr>
+          <a:lstStyle/>
+          <a:p>
+            <a:r>
+              <a:rPr lang="en-US" sz="2400" b="1" dirty="0">
+                <a:solidFill>
+                  <a:schemeClr val="accent1"/>
+                </a:solidFill>
+              </a:rPr>
+              <a:t>We usually will name it but not always</a:t>
+            </a:r>
+          </a:p>
+        </p:txBody>
+      </p:sp>
+      <p:sp>
+        <p:nvSpPr>
+          <p:cNvPr id="8" name="TextBox 7">
+            <a:extLst>
+              <a:ext uri="{FF2B5EF4-FFF2-40B4-BE49-F238E27FC236}">
+                <a16:creationId xmlns:a16="http://schemas.microsoft.com/office/drawing/2014/main" id="{6D2219B1-A9A3-40ED-8D3D-F92178748361}"/>
+              </a:ext>
+            </a:extLst>
+          </p:cNvPr>
+          <p:cNvSpPr txBox="1"/>
+          <p:nvPr/>
+        </p:nvSpPr>
+        <p:spPr>
+          <a:xfrm>
+            <a:off x="1143000" y="3429000"/>
+            <a:ext cx="6101442" cy="461665"/>
+          </a:xfrm>
+          <a:prstGeom prst="rect">
+            <a:avLst/>
+          </a:prstGeom>
+          <a:solidFill>
+            <a:schemeClr val="tx1"/>
+          </a:solidFill>
+        </p:spPr>
+        <p:txBody>
+          <a:bodyPr wrap="square">
+            <a:spAutoFit/>
+          </a:bodyPr>
+          <a:lstStyle/>
+          <a:p>
+            <a:r>
+              <a:rPr lang="en-US" sz="2400" dirty="0">
+                <a:solidFill>
+                  <a:schemeClr val="bg2"/>
+                </a:solidFill>
+              </a:rPr>
+              <a:t>((lambda (x y) (+ x y)) 1 2)</a:t>
+            </a:r>
+          </a:p>
+        </p:txBody>
+      </p:sp>
+      <p:sp>
+        <p:nvSpPr>
+          <p:cNvPr id="9" name="Speech Bubble: Rectangle with Corners Rounded 8">
+            <a:extLst>
+              <a:ext uri="{FF2B5EF4-FFF2-40B4-BE49-F238E27FC236}">
+                <a16:creationId xmlns:a16="http://schemas.microsoft.com/office/drawing/2014/main" id="{BFF6CFAE-0306-41D6-B84E-E91209F1BFFF}"/>
+              </a:ext>
+            </a:extLst>
+          </p:cNvPr>
+          <p:cNvSpPr/>
+          <p:nvPr/>
+        </p:nvSpPr>
+        <p:spPr bwMode="auto">
+          <a:xfrm>
+            <a:off x="8484928" y="3807315"/>
+            <a:ext cx="3581400" cy="1983885"/>
+          </a:xfrm>
+          <a:prstGeom prst="wedgeRoundRectCallout">
+            <a:avLst>
+              <a:gd name="adj1" fmla="val 16248"/>
+              <a:gd name="adj2" fmla="val -181435"/>
+              <a:gd name="adj3" fmla="val 16667"/>
+            </a:avLst>
+          </a:prstGeom>
+          <a:solidFill>
+            <a:schemeClr val="accent1"/>
+          </a:solidFill>
+          <a:ln w="9525" cap="flat" cmpd="sng" algn="ctr">
+            <a:solidFill>
+              <a:schemeClr val="tx1"/>
+            </a:solidFill>
+            <a:prstDash val="solid"/>
+            <a:round/>
+            <a:headEnd type="none" w="med" len="med"/>
+            <a:tailEnd type="none" w="med" len="med"/>
+          </a:ln>
+          <a:effectLst/>
+        </p:spPr>
+        <p:txBody>
+          <a:bodyPr vert="horz" wrap="square" lIns="91440" tIns="45720" rIns="91440" bIns="45720" numCol="1" rtlCol="0" anchor="t" anchorCtr="0" compatLnSpc="1">
+            <a:prstTxWarp prst="textNoShape">
+              <a:avLst/>
+            </a:prstTxWarp>
+          </a:bodyPr>
+          <a:lstStyle/>
+          <a:p>
+            <a:pPr marL="0" marR="0" indent="0" algn="l" defTabSz="914400" rtl="0" eaLnBrk="0" fontAlgn="base" latinLnBrk="0" hangingPunct="0">
+              <a:lnSpc>
+                <a:spcPct val="100000"/>
+              </a:lnSpc>
+              <a:spcBef>
+                <a:spcPct val="0"/>
+              </a:spcBef>
+              <a:spcAft>
+                <a:spcPct val="0"/>
+              </a:spcAft>
+              <a:buClrTx/>
+              <a:buSzTx/>
+              <a:buFontTx/>
+              <a:buNone/>
+              <a:tabLst/>
+            </a:pPr>
+            <a:r>
+              <a:rPr kumimoji="0" lang="en-US" sz="1800" b="0" i="0" u="none" strike="noStrike" cap="none" normalizeH="0" baseline="0" dirty="0">
+                <a:ln>
+                  <a:noFill/>
+                </a:ln>
+                <a:solidFill>
+                  <a:schemeClr val="tx1"/>
+                </a:solidFill>
+                <a:effectLst/>
+                <a:latin typeface="Verdana" pitchFamily="34" charset="0"/>
+              </a:rPr>
+              <a:t>Sometimes called a “closure” or “lexical closure”</a:t>
+            </a:r>
+            <a:endParaRPr lang="en-US" dirty="0"/>
+          </a:p>
+          <a:p>
+            <a:pPr marL="0" marR="0" indent="0" algn="l" defTabSz="914400" rtl="0" eaLnBrk="0" fontAlgn="base" latinLnBrk="0" hangingPunct="0">
+              <a:lnSpc>
+                <a:spcPct val="100000"/>
+              </a:lnSpc>
+              <a:spcBef>
+                <a:spcPct val="0"/>
+              </a:spcBef>
+              <a:spcAft>
+                <a:spcPct val="0"/>
+              </a:spcAft>
+              <a:buClrTx/>
+              <a:buSzTx/>
+              <a:buFontTx/>
+              <a:buNone/>
+              <a:tabLst/>
+            </a:pPr>
+            <a:endParaRPr kumimoji="0" lang="en-US" sz="1800" b="0" i="0" u="none" strike="noStrike" cap="none" normalizeH="0" baseline="0" dirty="0">
+              <a:ln>
+                <a:noFill/>
+              </a:ln>
+              <a:solidFill>
+                <a:schemeClr val="tx1"/>
+              </a:solidFill>
+              <a:effectLst/>
+              <a:latin typeface="Verdana" pitchFamily="34" charset="0"/>
+            </a:endParaRPr>
+          </a:p>
+          <a:p>
+            <a:pPr marL="0" marR="0" indent="0" algn="l" defTabSz="914400" rtl="0" eaLnBrk="0" fontAlgn="base" latinLnBrk="0" hangingPunct="0">
+              <a:lnSpc>
+                <a:spcPct val="100000"/>
+              </a:lnSpc>
+              <a:spcBef>
+                <a:spcPct val="0"/>
+              </a:spcBef>
+              <a:spcAft>
+                <a:spcPct val="0"/>
+              </a:spcAft>
+              <a:buClrTx/>
+              <a:buSzTx/>
+              <a:buFontTx/>
+              <a:buNone/>
+              <a:tabLst/>
+            </a:pPr>
+            <a:r>
+              <a:rPr lang="en-US" dirty="0"/>
+              <a:t>Right now think blob of code that’s ready to run</a:t>
+            </a:r>
+            <a:endParaRPr kumimoji="0" lang="en-US" sz="1800" b="0" i="0" u="none" strike="noStrike" cap="none" normalizeH="0" baseline="0" dirty="0">
+              <a:ln>
+                <a:noFill/>
+              </a:ln>
+              <a:solidFill>
+                <a:schemeClr val="tx1"/>
+              </a:solidFill>
+              <a:effectLst/>
+              <a:latin typeface="Verdana" pitchFamily="34" charset="0"/>
+            </a:endParaRPr>
+          </a:p>
+        </p:txBody>
+      </p:sp>
+    </p:spTree>
+    <p:extLst>
+      <p:ext uri="{BB962C8B-B14F-4D97-AF65-F5344CB8AC3E}">
+        <p14:creationId xmlns:p14="http://schemas.microsoft.com/office/powerpoint/2010/main" val="899949444"/>
+      </p:ext>
+    </p:extLst>
+  </p:cSld>
+  <p:clrMapOvr>
+    <a:masterClrMapping/>
+  </p:clrMapOvr>
 </p:sld>
 </file>
 

</xml_diff>